<commit_message>
added newtex from db course proj
</commit_message>
<xml_diff>
--- a/НИР и ВКР/Презентация/ПронинАС_НИР_презентация.pptx
+++ b/НИР и ВКР/Презентация/ПронинАС_НИР_презентация.pptx
@@ -5640,76 +5640,12 @@
           <a:chExt cx="0" cy="0"/>
         </a:xfrm>
       </p:grpSpPr>
-      <p:sp>
-        <p:nvSpPr>
-          <p:cNvPr id="2" name="Заголовок 1">
-            <a:extLst>
-              <a:ext uri="{FF2B5EF4-FFF2-40B4-BE49-F238E27FC236}">
-                <a16:creationId xmlns:a16="http://schemas.microsoft.com/office/drawing/2014/main" id="{1802D59D-6A83-151A-EEA2-678960399BE4}"/>
-              </a:ext>
-            </a:extLst>
-          </p:cNvPr>
-          <p:cNvSpPr>
-            <a:spLocks noGrp="1"/>
-          </p:cNvSpPr>
-          <p:nvPr>
-            <p:ph type="title"/>
-          </p:nvPr>
-        </p:nvSpPr>
-        <p:spPr>
-          <a:xfrm>
-            <a:off x="428016" y="-72232"/>
-            <a:ext cx="11763983" cy="1325563"/>
-          </a:xfrm>
-        </p:spPr>
-        <p:txBody>
-          <a:bodyPr>
-            <a:normAutofit/>
-          </a:bodyPr>
-          <a:lstStyle/>
-          <a:p>
-            <a:r>
-              <a:rPr lang="ru-RU" sz="4000" b="1" dirty="0"/>
-              <a:t>Алгоритм получения ассоциативных правил Apriori</a:t>
-            </a:r>
-          </a:p>
-        </p:txBody>
-      </p:sp>
-      <p:sp>
-        <p:nvSpPr>
-          <p:cNvPr id="4" name="Номер слайда 3">
-            <a:extLst>
-              <a:ext uri="{FF2B5EF4-FFF2-40B4-BE49-F238E27FC236}">
-                <a16:creationId xmlns:a16="http://schemas.microsoft.com/office/drawing/2014/main" id="{80FEEFAF-0D6B-464C-7360-370FF23083CC}"/>
-              </a:ext>
-            </a:extLst>
-          </p:cNvPr>
-          <p:cNvSpPr>
-            <a:spLocks noGrp="1"/>
-          </p:cNvSpPr>
-          <p:nvPr>
-            <p:ph type="sldNum" sz="quarter" idx="12"/>
-          </p:nvPr>
-        </p:nvSpPr>
-        <p:spPr/>
-        <p:txBody>
-          <a:bodyPr/>
-          <a:lstStyle/>
-          <a:p>
-            <a:fld id="{E83D2FD5-BBDA-43D0-B172-791327EA2B6A}" type="slidenum">
-              <a:rPr lang="ru-RU" smtClean="0"/>
-              <a:t>6</a:t>
-            </a:fld>
-            <a:endParaRPr lang="ru-RU" dirty="0"/>
-          </a:p>
-        </p:txBody>
-      </p:sp>
       <p:pic>
         <p:nvPicPr>
-          <p:cNvPr id="14" name="Рисунок 13">
-            <a:extLst>
-              <a:ext uri="{FF2B5EF4-FFF2-40B4-BE49-F238E27FC236}">
-                <a16:creationId xmlns:a16="http://schemas.microsoft.com/office/drawing/2014/main" id="{CDABA089-439E-4C81-AE26-64F26D679FFA}"/>
+          <p:cNvPr id="24" name="Рисунок 23">
+            <a:extLst>
+              <a:ext uri="{FF2B5EF4-FFF2-40B4-BE49-F238E27FC236}">
+                <a16:creationId xmlns:a16="http://schemas.microsoft.com/office/drawing/2014/main" id="{95825B38-A1E9-479F-BBE2-537F66F3CF44}"/>
               </a:ext>
             </a:extLst>
           </p:cNvPr>
@@ -5732,20 +5668,84 @@
         </p:blipFill>
         <p:spPr>
           <a:xfrm>
-            <a:off x="0" y="1364853"/>
-            <a:ext cx="6522077" cy="4128294"/>
+            <a:off x="6314075" y="3484072"/>
+            <a:ext cx="5548039" cy="2798460"/>
           </a:xfrm>
           <a:prstGeom prst="rect">
             <a:avLst/>
           </a:prstGeom>
         </p:spPr>
       </p:pic>
+      <p:sp>
+        <p:nvSpPr>
+          <p:cNvPr id="2" name="Заголовок 1">
+            <a:extLst>
+              <a:ext uri="{FF2B5EF4-FFF2-40B4-BE49-F238E27FC236}">
+                <a16:creationId xmlns:a16="http://schemas.microsoft.com/office/drawing/2014/main" id="{1802D59D-6A83-151A-EEA2-678960399BE4}"/>
+              </a:ext>
+            </a:extLst>
+          </p:cNvPr>
+          <p:cNvSpPr>
+            <a:spLocks noGrp="1"/>
+          </p:cNvSpPr>
+          <p:nvPr>
+            <p:ph type="title"/>
+          </p:nvPr>
+        </p:nvSpPr>
+        <p:spPr>
+          <a:xfrm>
+            <a:off x="428016" y="-72232"/>
+            <a:ext cx="11763983" cy="1325563"/>
+          </a:xfrm>
+        </p:spPr>
+        <p:txBody>
+          <a:bodyPr>
+            <a:normAutofit/>
+          </a:bodyPr>
+          <a:lstStyle/>
+          <a:p>
+            <a:r>
+              <a:rPr lang="ru-RU" sz="4000" b="1" dirty="0"/>
+              <a:t>Алгоритм получения ассоциативных правил Apriori</a:t>
+            </a:r>
+          </a:p>
+        </p:txBody>
+      </p:sp>
+      <p:sp>
+        <p:nvSpPr>
+          <p:cNvPr id="4" name="Номер слайда 3">
+            <a:extLst>
+              <a:ext uri="{FF2B5EF4-FFF2-40B4-BE49-F238E27FC236}">
+                <a16:creationId xmlns:a16="http://schemas.microsoft.com/office/drawing/2014/main" id="{80FEEFAF-0D6B-464C-7360-370FF23083CC}"/>
+              </a:ext>
+            </a:extLst>
+          </p:cNvPr>
+          <p:cNvSpPr>
+            <a:spLocks noGrp="1"/>
+          </p:cNvSpPr>
+          <p:nvPr>
+            <p:ph type="sldNum" sz="quarter" idx="12"/>
+          </p:nvPr>
+        </p:nvSpPr>
+        <p:spPr/>
+        <p:txBody>
+          <a:bodyPr/>
+          <a:lstStyle/>
+          <a:p>
+            <a:fld id="{E83D2FD5-BBDA-43D0-B172-791327EA2B6A}" type="slidenum">
+              <a:rPr lang="ru-RU" smtClean="0"/>
+              <a:t>6</a:t>
+            </a:fld>
+            <a:endParaRPr lang="ru-RU" dirty="0"/>
+          </a:p>
+        </p:txBody>
+      </p:sp>
       <p:pic>
         <p:nvPicPr>
-          <p:cNvPr id="24" name="Рисунок 23">
-            <a:extLst>
-              <a:ext uri="{FF2B5EF4-FFF2-40B4-BE49-F238E27FC236}">
-                <a16:creationId xmlns:a16="http://schemas.microsoft.com/office/drawing/2014/main" id="{95825B38-A1E9-479F-BBE2-537F66F3CF44}"/>
+          <p:cNvPr id="14" name="Рисунок 13">
+            <a:extLst>
+              <a:ext uri="{FF2B5EF4-FFF2-40B4-BE49-F238E27FC236}">
+                <a16:creationId xmlns:a16="http://schemas.microsoft.com/office/drawing/2014/main" id="{CDABA089-439E-4C81-AE26-64F26D679FFA}"/>
               </a:ext>
             </a:extLst>
           </p:cNvPr>
@@ -5768,8 +5768,8 @@
         </p:blipFill>
         <p:spPr>
           <a:xfrm>
-            <a:off x="6522077" y="2029770"/>
-            <a:ext cx="5548039" cy="2798460"/>
+            <a:off x="329886" y="1041003"/>
+            <a:ext cx="6522077" cy="4128294"/>
           </a:xfrm>
           <a:prstGeom prst="rect">
             <a:avLst/>

</xml_diff>

<commit_message>
Almost done (ToDo biblio)
</commit_message>
<xml_diff>
--- a/НИР и ВКР/Презентация/ПронинАС_НИР_презентация.pptx
+++ b/НИР и ВКР/Презентация/ПронинАС_НИР_презентация.pptx
@@ -5,21 +5,20 @@
     <p:sldMasterId id="2147483648" r:id="rId1"/>
   </p:sldMasterIdLst>
   <p:notesMasterIdLst>
-    <p:notesMasterId r:id="rId14"/>
+    <p:notesMasterId r:id="rId13"/>
   </p:notesMasterIdLst>
   <p:sldIdLst>
     <p:sldId id="256" r:id="rId2"/>
     <p:sldId id="257" r:id="rId3"/>
     <p:sldId id="292" r:id="rId4"/>
-    <p:sldId id="279" r:id="rId5"/>
-    <p:sldId id="289" r:id="rId6"/>
-    <p:sldId id="291" r:id="rId7"/>
-    <p:sldId id="286" r:id="rId8"/>
-    <p:sldId id="290" r:id="rId9"/>
-    <p:sldId id="284" r:id="rId10"/>
-    <p:sldId id="281" r:id="rId11"/>
-    <p:sldId id="282" r:id="rId12"/>
-    <p:sldId id="266" r:id="rId13"/>
+    <p:sldId id="289" r:id="rId5"/>
+    <p:sldId id="291" r:id="rId6"/>
+    <p:sldId id="286" r:id="rId7"/>
+    <p:sldId id="290" r:id="rId8"/>
+    <p:sldId id="284" r:id="rId9"/>
+    <p:sldId id="281" r:id="rId10"/>
+    <p:sldId id="282" r:id="rId11"/>
+    <p:sldId id="266" r:id="rId12"/>
   </p:sldIdLst>
   <p:sldSz cx="12192000" cy="6858000"/>
   <p:notesSz cx="6858000" cy="9144000"/>
@@ -208,7 +207,7 @@
           <a:p>
             <a:fld id="{A1FA72BB-6139-4A02-8082-35B9C9D89E0C}" type="datetimeFigureOut">
               <a:rPr lang="ru-RU" smtClean="0"/>
-              <a:t>17.01.2023</a:t>
+              <a:t>18.01.2023</a:t>
             </a:fld>
             <a:endParaRPr lang="ru-RU"/>
           </a:p>
@@ -540,7 +539,7 @@
           <a:p>
             <a:fld id="{E3BF92F7-6176-4844-94CE-FF1FD83770F1}" type="slidenum">
               <a:rPr lang="ru-RU" smtClean="0"/>
-              <a:t>9</a:t>
+              <a:t>8</a:t>
             </a:fld>
             <a:endParaRPr lang="ru-RU"/>
           </a:p>
@@ -624,7 +623,7 @@
           <a:p>
             <a:fld id="{E3BF92F7-6176-4844-94CE-FF1FD83770F1}" type="slidenum">
               <a:rPr lang="ru-RU" smtClean="0"/>
-              <a:t>12</a:t>
+              <a:t>11</a:t>
             </a:fld>
             <a:endParaRPr lang="ru-RU"/>
           </a:p>
@@ -790,7 +789,7 @@
           <a:p>
             <a:fld id="{D006F585-C031-4F3D-8109-2C1271EAF95C}" type="datetime1">
               <a:rPr lang="ru-RU" smtClean="0"/>
-              <a:t>17.01.2023</a:t>
+              <a:t>18.01.2023</a:t>
             </a:fld>
             <a:endParaRPr lang="ru-RU"/>
           </a:p>
@@ -988,7 +987,7 @@
           <a:p>
             <a:fld id="{863B978C-907D-410C-AC33-C70FB0065AB1}" type="datetime1">
               <a:rPr lang="ru-RU" smtClean="0"/>
-              <a:t>17.01.2023</a:t>
+              <a:t>18.01.2023</a:t>
             </a:fld>
             <a:endParaRPr lang="ru-RU"/>
           </a:p>
@@ -1196,7 +1195,7 @@
           <a:p>
             <a:fld id="{7370F86F-261F-4C2A-B7CA-06D91EEBB15B}" type="datetime1">
               <a:rPr lang="ru-RU" smtClean="0"/>
-              <a:t>17.01.2023</a:t>
+              <a:t>18.01.2023</a:t>
             </a:fld>
             <a:endParaRPr lang="ru-RU"/>
           </a:p>
@@ -1394,7 +1393,7 @@
           <a:p>
             <a:fld id="{AFEE3786-D129-4BD2-B6F3-55FC5BC12532}" type="datetime1">
               <a:rPr lang="ru-RU" smtClean="0"/>
-              <a:t>17.01.2023</a:t>
+              <a:t>18.01.2023</a:t>
             </a:fld>
             <a:endParaRPr lang="ru-RU"/>
           </a:p>
@@ -1669,7 +1668,7 @@
           <a:p>
             <a:fld id="{C9466CFB-2389-4A9C-AD12-8B6FB05D3E41}" type="datetime1">
               <a:rPr lang="ru-RU" smtClean="0"/>
-              <a:t>17.01.2023</a:t>
+              <a:t>18.01.2023</a:t>
             </a:fld>
             <a:endParaRPr lang="ru-RU"/>
           </a:p>
@@ -1934,7 +1933,7 @@
           <a:p>
             <a:fld id="{6E930FF5-4E67-4BB3-A0D6-D5DBBB9A8A64}" type="datetime1">
               <a:rPr lang="ru-RU" smtClean="0"/>
-              <a:t>17.01.2023</a:t>
+              <a:t>18.01.2023</a:t>
             </a:fld>
             <a:endParaRPr lang="ru-RU"/>
           </a:p>
@@ -2346,7 +2345,7 @@
           <a:p>
             <a:fld id="{1F915F62-A180-4781-87B2-C363CCD39E80}" type="datetime1">
               <a:rPr lang="ru-RU" smtClean="0"/>
-              <a:t>17.01.2023</a:t>
+              <a:t>18.01.2023</a:t>
             </a:fld>
             <a:endParaRPr lang="ru-RU"/>
           </a:p>
@@ -2487,7 +2486,7 @@
           <a:p>
             <a:fld id="{67FD249C-BC1A-4A70-A502-0DCD1E4E82B3}" type="datetime1">
               <a:rPr lang="ru-RU" smtClean="0"/>
-              <a:t>17.01.2023</a:t>
+              <a:t>18.01.2023</a:t>
             </a:fld>
             <a:endParaRPr lang="ru-RU"/>
           </a:p>
@@ -2600,7 +2599,7 @@
           <a:p>
             <a:fld id="{45D5B91C-A2D9-4813-A97B-31FA3A6207FE}" type="datetime1">
               <a:rPr lang="ru-RU" smtClean="0"/>
-              <a:t>17.01.2023</a:t>
+              <a:t>18.01.2023</a:t>
             </a:fld>
             <a:endParaRPr lang="ru-RU"/>
           </a:p>
@@ -2911,7 +2910,7 @@
           <a:p>
             <a:fld id="{BD9E5343-4C2F-4429-B1C5-87457F54369C}" type="datetime1">
               <a:rPr lang="ru-RU" smtClean="0"/>
-              <a:t>17.01.2023</a:t>
+              <a:t>18.01.2023</a:t>
             </a:fld>
             <a:endParaRPr lang="ru-RU"/>
           </a:p>
@@ -3199,7 +3198,7 @@
           <a:p>
             <a:fld id="{802D0396-A548-40ED-918D-A78893C27574}" type="datetime1">
               <a:rPr lang="ru-RU" smtClean="0"/>
-              <a:t>17.01.2023</a:t>
+              <a:t>18.01.2023</a:t>
             </a:fld>
             <a:endParaRPr lang="ru-RU"/>
           </a:p>
@@ -3440,7 +3439,7 @@
           <a:p>
             <a:fld id="{3ECCE158-C433-4D4B-A18E-F373B1318AC3}" type="datetime1">
               <a:rPr lang="ru-RU" smtClean="0"/>
-              <a:t>17.01.2023</a:t>
+              <a:t>18.01.2023</a:t>
             </a:fld>
             <a:endParaRPr lang="ru-RU"/>
           </a:p>
@@ -4268,92 +4267,7 @@
           <a:p>
             <a:r>
               <a:rPr lang="ru-RU" sz="4000" b="1" dirty="0"/>
-              <a:t>Классификация</a:t>
-            </a:r>
-          </a:p>
-        </p:txBody>
-      </p:sp>
-      <p:sp>
-        <p:nvSpPr>
-          <p:cNvPr id="3" name="Объект 2">
-            <a:extLst>
-              <a:ext uri="{FF2B5EF4-FFF2-40B4-BE49-F238E27FC236}">
-                <a16:creationId xmlns:a16="http://schemas.microsoft.com/office/drawing/2014/main" id="{68541323-2632-074C-E69F-FC80AB230174}"/>
-              </a:ext>
-            </a:extLst>
-          </p:cNvPr>
-          <p:cNvSpPr>
-            <a:spLocks noGrp="1"/>
-          </p:cNvSpPr>
-          <p:nvPr>
-            <p:ph idx="1"/>
-          </p:nvPr>
-        </p:nvSpPr>
-        <p:spPr>
-          <a:xfrm>
-            <a:off x="428017" y="1253331"/>
-            <a:ext cx="11182378" cy="5168894"/>
-          </a:xfrm>
-        </p:spPr>
-        <p:txBody>
-          <a:bodyPr>
-            <a:noAutofit/>
-          </a:bodyPr>
-          <a:lstStyle/>
-          <a:p>
-            <a:pPr marL="571500" indent="-342900" algn="just">
-              <a:lnSpc>
-                <a:spcPct val="100000"/>
-              </a:lnSpc>
-            </a:pPr>
-            <a:r>
-              <a:rPr lang="ru-RU" sz="2200" dirty="0">
-                <a:latin typeface="Times New Roman" panose="02020603050405020304" pitchFamily="18" charset="0"/>
-                <a:ea typeface="Times New Roman" panose="02020603050405020304" pitchFamily="18" charset="0"/>
-              </a:rPr>
-              <a:t>поиск ассоциативных правил;</a:t>
-            </a:r>
-          </a:p>
-          <a:p>
-            <a:pPr marL="571500" indent="-342900" algn="just">
-              <a:lnSpc>
-                <a:spcPct val="100000"/>
-              </a:lnSpc>
-            </a:pPr>
-            <a:r>
-              <a:rPr lang="ru-RU" sz="2200" dirty="0">
-                <a:latin typeface="Times New Roman" panose="02020603050405020304" pitchFamily="18" charset="0"/>
-                <a:ea typeface="Times New Roman" panose="02020603050405020304" pitchFamily="18" charset="0"/>
-              </a:rPr>
-              <a:t>поиск последовательных шаблонов;</a:t>
-            </a:r>
-          </a:p>
-          <a:p>
-            <a:pPr marL="571500" indent="-342900" algn="just">
-              <a:lnSpc>
-                <a:spcPct val="100000"/>
-              </a:lnSpc>
-            </a:pPr>
-            <a:r>
-              <a:rPr lang="ru-RU" sz="2200" dirty="0">
-                <a:latin typeface="Times New Roman" panose="02020603050405020304" pitchFamily="18" charset="0"/>
-                <a:ea typeface="Times New Roman" panose="02020603050405020304" pitchFamily="18" charset="0"/>
-              </a:rPr>
-              <a:t>сбор и анализ временных характеристик выполнения пользователем действий и промежутков между ними;</a:t>
-            </a:r>
-          </a:p>
-          <a:p>
-            <a:pPr marL="571500" indent="-342900" algn="just">
-              <a:lnSpc>
-                <a:spcPct val="100000"/>
-              </a:lnSpc>
-            </a:pPr>
-            <a:r>
-              <a:rPr lang="ru-RU" sz="2200" dirty="0">
-                <a:latin typeface="Times New Roman" panose="02020603050405020304" pitchFamily="18" charset="0"/>
-                <a:ea typeface="Times New Roman" panose="02020603050405020304" pitchFamily="18" charset="0"/>
-              </a:rPr>
-              <a:t>вычисление уровней поддержки шаблонов поведения пользователя.</a:t>
+              <a:t>Сравнение методов</a:t>
             </a:r>
           </a:p>
         </p:txBody>
@@ -4387,10 +4301,40 @@
           </a:p>
         </p:txBody>
       </p:sp>
+      <p:pic>
+        <p:nvPicPr>
+          <p:cNvPr id="5" name="Рисунок 4">
+            <a:extLst>
+              <a:ext uri="{FF2B5EF4-FFF2-40B4-BE49-F238E27FC236}">
+                <a16:creationId xmlns:a16="http://schemas.microsoft.com/office/drawing/2014/main" id="{19C3551D-14D2-4A2C-A7C6-390C77ABE353}"/>
+              </a:ext>
+            </a:extLst>
+          </p:cNvPr>
+          <p:cNvPicPr>
+            <a:picLocks noChangeAspect="1"/>
+          </p:cNvPicPr>
+          <p:nvPr/>
+        </p:nvPicPr>
+        <p:blipFill>
+          <a:blip r:embed="rId2"/>
+          <a:stretch>
+            <a:fillRect/>
+          </a:stretch>
+        </p:blipFill>
+        <p:spPr>
+          <a:xfrm>
+            <a:off x="2300476" y="1011775"/>
+            <a:ext cx="6942131" cy="5586131"/>
+          </a:xfrm>
+          <a:prstGeom prst="rect">
+            <a:avLst/>
+          </a:prstGeom>
+        </p:spPr>
+      </p:pic>
     </p:spTree>
     <p:extLst>
       <p:ext uri="{BB962C8B-B14F-4D97-AF65-F5344CB8AC3E}">
-        <p14:creationId xmlns:p14="http://schemas.microsoft.com/office/powerpoint/2010/main" val="2176375297"/>
+        <p14:creationId xmlns:p14="http://schemas.microsoft.com/office/powerpoint/2010/main" val="649740196"/>
       </p:ext>
     </p:extLst>
   </p:cSld>
@@ -4447,130 +4391,6 @@
           <a:p>
             <a:r>
               <a:rPr lang="ru-RU" sz="4000" b="1" dirty="0"/>
-              <a:t>Сравнение методов</a:t>
-            </a:r>
-          </a:p>
-        </p:txBody>
-      </p:sp>
-      <p:sp>
-        <p:nvSpPr>
-          <p:cNvPr id="4" name="Номер слайда 3">
-            <a:extLst>
-              <a:ext uri="{FF2B5EF4-FFF2-40B4-BE49-F238E27FC236}">
-                <a16:creationId xmlns:a16="http://schemas.microsoft.com/office/drawing/2014/main" id="{80FEEFAF-0D6B-464C-7360-370FF23083CC}"/>
-              </a:ext>
-            </a:extLst>
-          </p:cNvPr>
-          <p:cNvSpPr>
-            <a:spLocks noGrp="1"/>
-          </p:cNvSpPr>
-          <p:nvPr>
-            <p:ph type="sldNum" sz="quarter" idx="12"/>
-          </p:nvPr>
-        </p:nvSpPr>
-        <p:spPr/>
-        <p:txBody>
-          <a:bodyPr/>
-          <a:lstStyle/>
-          <a:p>
-            <a:fld id="{E83D2FD5-BBDA-43D0-B172-791327EA2B6A}" type="slidenum">
-              <a:rPr lang="ru-RU" smtClean="0"/>
-              <a:t>11</a:t>
-            </a:fld>
-            <a:endParaRPr lang="ru-RU" dirty="0"/>
-          </a:p>
-        </p:txBody>
-      </p:sp>
-      <p:pic>
-        <p:nvPicPr>
-          <p:cNvPr id="6" name="Рисунок 5">
-            <a:extLst>
-              <a:ext uri="{FF2B5EF4-FFF2-40B4-BE49-F238E27FC236}">
-                <a16:creationId xmlns:a16="http://schemas.microsoft.com/office/drawing/2014/main" id="{35A70FED-7A83-44C0-8483-844878DCC4DB}"/>
-              </a:ext>
-            </a:extLst>
-          </p:cNvPr>
-          <p:cNvPicPr>
-            <a:picLocks noChangeAspect="1"/>
-          </p:cNvPicPr>
-          <p:nvPr/>
-        </p:nvPicPr>
-        <p:blipFill>
-          <a:blip r:embed="rId2"/>
-          <a:stretch>
-            <a:fillRect/>
-          </a:stretch>
-        </p:blipFill>
-        <p:spPr>
-          <a:xfrm>
-            <a:off x="2464755" y="1119981"/>
-            <a:ext cx="7262489" cy="5090601"/>
-          </a:xfrm>
-          <a:prstGeom prst="rect">
-            <a:avLst/>
-          </a:prstGeom>
-        </p:spPr>
-      </p:pic>
-    </p:spTree>
-    <p:extLst>
-      <p:ext uri="{BB962C8B-B14F-4D97-AF65-F5344CB8AC3E}">
-        <p14:creationId xmlns:p14="http://schemas.microsoft.com/office/powerpoint/2010/main" val="649740196"/>
-      </p:ext>
-    </p:extLst>
-  </p:cSld>
-  <p:clrMapOvr>
-    <a:masterClrMapping/>
-  </p:clrMapOvr>
-</p:sld>
-</file>
-
-<file path=ppt/slides/slide12.xml><?xml version="1.0" encoding="utf-8"?>
-<p:sld xmlns:a="http://schemas.openxmlformats.org/drawingml/2006/main" xmlns:r="http://schemas.openxmlformats.org/officeDocument/2006/relationships" xmlns:p="http://schemas.openxmlformats.org/presentationml/2006/main">
-  <p:cSld>
-    <p:spTree>
-      <p:nvGrpSpPr>
-        <p:cNvPr id="1" name=""/>
-        <p:cNvGrpSpPr/>
-        <p:nvPr/>
-      </p:nvGrpSpPr>
-      <p:grpSpPr>
-        <a:xfrm>
-          <a:off x="0" y="0"/>
-          <a:ext cx="0" cy="0"/>
-          <a:chOff x="0" y="0"/>
-          <a:chExt cx="0" cy="0"/>
-        </a:xfrm>
-      </p:grpSpPr>
-      <p:sp>
-        <p:nvSpPr>
-          <p:cNvPr id="2" name="Заголовок 1">
-            <a:extLst>
-              <a:ext uri="{FF2B5EF4-FFF2-40B4-BE49-F238E27FC236}">
-                <a16:creationId xmlns:a16="http://schemas.microsoft.com/office/drawing/2014/main" id="{1802D59D-6A83-151A-EEA2-678960399BE4}"/>
-              </a:ext>
-            </a:extLst>
-          </p:cNvPr>
-          <p:cNvSpPr>
-            <a:spLocks noGrp="1"/>
-          </p:cNvSpPr>
-          <p:nvPr>
-            <p:ph type="title"/>
-          </p:nvPr>
-        </p:nvSpPr>
-        <p:spPr>
-          <a:xfrm>
-            <a:off x="428017" y="-72232"/>
-            <a:ext cx="10515600" cy="1325563"/>
-          </a:xfrm>
-        </p:spPr>
-        <p:txBody>
-          <a:bodyPr>
-            <a:normAutofit/>
-          </a:bodyPr>
-          <a:lstStyle/>
-          <a:p>
-            <a:r>
-              <a:rPr lang="ru-RU" sz="4000" b="1" dirty="0"/>
               <a:t>Заключение</a:t>
             </a:r>
           </a:p>
@@ -4599,7 +4419,7 @@
           <a:p>
             <a:fld id="{E83D2FD5-BBDA-43D0-B172-791327EA2B6A}" type="slidenum">
               <a:rPr lang="ru-RU" smtClean="0"/>
-              <a:t>12</a:t>
+              <a:t>11</a:t>
             </a:fld>
             <a:endParaRPr lang="ru-RU" dirty="0"/>
           </a:p>
@@ -4607,69 +4427,106 @@
       </p:sp>
       <p:sp>
         <p:nvSpPr>
-          <p:cNvPr id="6" name="TextBox 5">
+          <p:cNvPr id="5" name="Объект 2">
             <a:extLst>
               <a:ext uri="{FF2B5EF4-FFF2-40B4-BE49-F238E27FC236}">
-                <a16:creationId xmlns:a16="http://schemas.microsoft.com/office/drawing/2014/main" id="{2D470598-F431-7236-E773-E52438A47E25}"/>
+                <a16:creationId xmlns:a16="http://schemas.microsoft.com/office/drawing/2014/main" id="{02C33000-B0B7-4509-AD8C-600B0EFAA229}"/>
               </a:ext>
             </a:extLst>
           </p:cNvPr>
-          <p:cNvSpPr txBox="1"/>
-          <p:nvPr/>
+          <p:cNvSpPr>
+            <a:spLocks noGrp="1"/>
+          </p:cNvSpPr>
+          <p:nvPr>
+            <p:ph idx="1"/>
+          </p:nvPr>
         </p:nvSpPr>
         <p:spPr>
           <a:xfrm>
             <a:off x="428017" y="1253331"/>
-            <a:ext cx="11342075" cy="3586366"/>
+            <a:ext cx="11182378" cy="5168894"/>
           </a:xfrm>
-          <a:prstGeom prst="rect">
-            <a:avLst/>
-          </a:prstGeom>
-          <a:noFill/>
         </p:spPr>
         <p:txBody>
-          <a:bodyPr wrap="square">
-            <a:spAutoFit/>
+          <a:bodyPr>
+            <a:noAutofit/>
           </a:bodyPr>
           <a:lstStyle/>
           <a:p>
-            <a:pPr indent="450215" algn="just">
+            <a:pPr indent="0">
               <a:lnSpc>
-                <a:spcPct val="150000"/>
+                <a:spcPct val="100000"/>
               </a:lnSpc>
+              <a:buNone/>
             </a:pPr>
             <a:r>
-              <a:rPr lang="ru-RU" sz="2200" dirty="0">
+              <a:rPr lang="ru-RU" sz="2600" dirty="0">
+                <a:effectLst/>
                 <a:latin typeface="Times New Roman" panose="02020603050405020304" pitchFamily="18" charset="0"/>
                 <a:ea typeface="Times New Roman" panose="02020603050405020304" pitchFamily="18" charset="0"/>
               </a:rPr>
-              <a:t>По итогу проделанной работы была достигнута цель - проведен обзор существующих методов анализа пользовательской активности, сформулированы критерии для их оценки и проведено сравнение рассмотренных методов.</a:t>
-            </a:r>
-          </a:p>
-          <a:p>
-            <a:pPr indent="450215" algn="just">
+              <a:t>По итогу проделанной работы была достигнута </a:t>
+            </a:r>
+            <a:r>
+              <a:rPr lang="ru-RU" sz="2600" b="1" dirty="0">
+                <a:effectLst/>
+                <a:latin typeface="Times New Roman" panose="02020603050405020304" pitchFamily="18" charset="0"/>
+                <a:ea typeface="Times New Roman" panose="02020603050405020304" pitchFamily="18" charset="0"/>
+              </a:rPr>
+              <a:t>цель</a:t>
+            </a:r>
+            <a:r>
+              <a:rPr lang="ru-RU" sz="2600" dirty="0">
+                <a:effectLst/>
+                <a:latin typeface="Times New Roman" panose="02020603050405020304" pitchFamily="18" charset="0"/>
+                <a:ea typeface="Times New Roman" panose="02020603050405020304" pitchFamily="18" charset="0"/>
+              </a:rPr>
+              <a:t> - проведен обзор существующих методов анализа пользовательской активности, сформулированы критерии для их оценки и проведено сравнение рассмотренных методов.</a:t>
+            </a:r>
+          </a:p>
+          <a:p>
+            <a:pPr indent="0">
               <a:lnSpc>
-                <a:spcPct val="150000"/>
+                <a:spcPct val="100000"/>
               </a:lnSpc>
+              <a:buNone/>
             </a:pPr>
             <a:r>
-              <a:rPr lang="ru-RU" sz="2200" dirty="0">
+              <a:rPr lang="ru-RU" sz="2600" dirty="0">
+                <a:effectLst/>
                 <a:latin typeface="Times New Roman" panose="02020603050405020304" pitchFamily="18" charset="0"/>
                 <a:ea typeface="Times New Roman" panose="02020603050405020304" pitchFamily="18" charset="0"/>
               </a:rPr>
-              <a:t>Также были решены все поставленные задачи, а именно:</a:t>
-            </a:r>
-          </a:p>
-          <a:p>
-            <a:pPr marL="457200" indent="-457200" algn="just">
+              <a:t>Также были решены все поставленные </a:t>
+            </a:r>
+            <a:r>
+              <a:rPr lang="ru-RU" sz="2600" b="1" dirty="0">
+                <a:effectLst/>
+                <a:latin typeface="Times New Roman" panose="02020603050405020304" pitchFamily="18" charset="0"/>
+                <a:ea typeface="Times New Roman" panose="02020603050405020304" pitchFamily="18" charset="0"/>
+              </a:rPr>
+              <a:t>задачи</a:t>
+            </a:r>
+            <a:r>
+              <a:rPr lang="ru-RU" sz="2600" dirty="0">
+                <a:effectLst/>
+                <a:latin typeface="Times New Roman" panose="02020603050405020304" pitchFamily="18" charset="0"/>
+                <a:ea typeface="Times New Roman" panose="02020603050405020304" pitchFamily="18" charset="0"/>
+              </a:rPr>
+              <a:t>, а именно:</a:t>
+            </a:r>
+          </a:p>
+          <a:p>
+            <a:pPr marL="742950" indent="-514350">
               <a:lnSpc>
-                <a:spcPct val="150000"/>
+                <a:spcPct val="100000"/>
               </a:lnSpc>
               <a:buFont typeface="+mj-lt"/>
               <a:buAutoNum type="arabicParenR"/>
             </a:pPr>
             <a:r>
-              <a:rPr lang="ru-RU" sz="2200" dirty="0">
+              <a:rPr lang="ru-RU" sz="2600" dirty="0">
+                <a:effectLst/>
                 <a:latin typeface="Times New Roman" panose="02020603050405020304" pitchFamily="18" charset="0"/>
                 <a:ea typeface="Times New Roman" panose="02020603050405020304" pitchFamily="18" charset="0"/>
               </a:rPr>
@@ -4677,15 +4534,16 @@
             </a:r>
           </a:p>
           <a:p>
-            <a:pPr marL="457200" indent="-457200" algn="just">
+            <a:pPr marL="742950" indent="-514350">
               <a:lnSpc>
-                <a:spcPct val="150000"/>
+                <a:spcPct val="100000"/>
               </a:lnSpc>
               <a:buFont typeface="+mj-lt"/>
               <a:buAutoNum type="arabicParenR"/>
             </a:pPr>
             <a:r>
-              <a:rPr lang="ru-RU" sz="2200" dirty="0">
+              <a:rPr lang="ru-RU" sz="2600" dirty="0">
+                <a:effectLst/>
                 <a:latin typeface="Times New Roman" panose="02020603050405020304" pitchFamily="18" charset="0"/>
                 <a:ea typeface="Times New Roman" panose="02020603050405020304" pitchFamily="18" charset="0"/>
               </a:rPr>
@@ -4693,21 +4551,30 @@
             </a:r>
           </a:p>
           <a:p>
-            <a:pPr marL="457200" indent="-457200" algn="just">
+            <a:pPr marL="742950" indent="-514350">
               <a:lnSpc>
-                <a:spcPct val="150000"/>
+                <a:spcPct val="100000"/>
               </a:lnSpc>
               <a:buFont typeface="+mj-lt"/>
               <a:buAutoNum type="arabicParenR"/>
             </a:pPr>
             <a:r>
-              <a:rPr lang="ru-RU" sz="2200" dirty="0">
+              <a:rPr lang="ru-RU" sz="2600" dirty="0">
+                <a:effectLst/>
                 <a:latin typeface="Times New Roman" panose="02020603050405020304" pitchFamily="18" charset="0"/>
                 <a:ea typeface="Times New Roman" panose="02020603050405020304" pitchFamily="18" charset="0"/>
               </a:rPr>
               <a:t>выбраны критерии для их оценки и проведено сравнение.</a:t>
             </a:r>
-            <a:endParaRPr lang="ru-RU" sz="2200" dirty="0">
+          </a:p>
+          <a:p>
+            <a:pPr indent="0">
+              <a:lnSpc>
+                <a:spcPct val="100000"/>
+              </a:lnSpc>
+              <a:buNone/>
+            </a:pPr>
+            <a:endParaRPr lang="ru-RU" sz="2600" dirty="0">
               <a:effectLst/>
               <a:latin typeface="Times New Roman" panose="02020603050405020304" pitchFamily="18" charset="0"/>
               <a:ea typeface="Times New Roman" panose="02020603050405020304" pitchFamily="18" charset="0"/>
@@ -4808,14 +4675,14 @@
           </a:bodyPr>
           <a:lstStyle/>
           <a:p>
-            <a:pPr indent="0" algn="just">
+            <a:pPr indent="0">
               <a:lnSpc>
                 <a:spcPct val="100000"/>
               </a:lnSpc>
               <a:buNone/>
             </a:pPr>
             <a:r>
-              <a:rPr lang="ru-RU" sz="2200" b="1" dirty="0">
+              <a:rPr lang="ru-RU" sz="2600" b="1" dirty="0">
                 <a:effectLst/>
                 <a:latin typeface="Times New Roman" panose="02020603050405020304" pitchFamily="18" charset="0"/>
                 <a:ea typeface="Times New Roman" panose="02020603050405020304" pitchFamily="18" charset="0"/>
@@ -4823,34 +4690,34 @@
               <a:t>Цель: </a:t>
             </a:r>
             <a:r>
-              <a:rPr lang="ru-RU" sz="2200" dirty="0">
+              <a:rPr lang="ru-RU" sz="2600" dirty="0">
                 <a:latin typeface="Times New Roman" panose="02020603050405020304" pitchFamily="18" charset="0"/>
                 <a:ea typeface="Times New Roman" panose="02020603050405020304" pitchFamily="18" charset="0"/>
               </a:rPr>
               <a:t>провести обзор существующих методов анализа пользовательской активности, сформулировать критерии для их оценки и провести сравнение рассмотренных методов.</a:t>
             </a:r>
-            <a:endParaRPr lang="ru-RU" sz="2200" dirty="0">
+            <a:endParaRPr lang="ru-RU" sz="2600" dirty="0">
               <a:effectLst/>
               <a:latin typeface="Times New Roman" panose="02020603050405020304" pitchFamily="18" charset="0"/>
               <a:ea typeface="Times New Roman" panose="02020603050405020304" pitchFamily="18" charset="0"/>
             </a:endParaRPr>
           </a:p>
           <a:p>
-            <a:pPr indent="0" algn="just">
+            <a:pPr indent="0">
               <a:lnSpc>
                 <a:spcPct val="100000"/>
               </a:lnSpc>
               <a:buNone/>
             </a:pPr>
             <a:r>
-              <a:rPr lang="ru-RU" sz="2200" b="1" dirty="0">
+              <a:rPr lang="ru-RU" sz="2600" b="1" dirty="0">
                 <a:latin typeface="Times New Roman" panose="02020603050405020304" pitchFamily="18" charset="0"/>
                 <a:ea typeface="Times New Roman" panose="02020603050405020304" pitchFamily="18" charset="0"/>
               </a:rPr>
               <a:t>Задачи</a:t>
             </a:r>
             <a:r>
-              <a:rPr lang="ru-RU" sz="2200" dirty="0">
+              <a:rPr lang="ru-RU" sz="2600" dirty="0">
                 <a:latin typeface="Times New Roman" panose="02020603050405020304" pitchFamily="18" charset="0"/>
                 <a:ea typeface="Times New Roman" panose="02020603050405020304" pitchFamily="18" charset="0"/>
               </a:rPr>
@@ -4858,7 +4725,7 @@
             </a:r>
           </a:p>
           <a:p>
-            <a:pPr marL="685800" indent="-457200" algn="just">
+            <a:pPr marL="685800" indent="-457200">
               <a:lnSpc>
                 <a:spcPct val="100000"/>
               </a:lnSpc>
@@ -4866,7 +4733,7 @@
               <a:buAutoNum type="arabicParenR"/>
             </a:pPr>
             <a:r>
-              <a:rPr lang="ru-RU" sz="2200" dirty="0">
+              <a:rPr lang="ru-RU" sz="2600" dirty="0">
                 <a:latin typeface="Times New Roman" panose="02020603050405020304" pitchFamily="18" charset="0"/>
                 <a:ea typeface="Times New Roman" panose="02020603050405020304" pitchFamily="18" charset="0"/>
               </a:rPr>
@@ -4874,7 +4741,7 @@
             </a:r>
           </a:p>
           <a:p>
-            <a:pPr marL="685800" indent="-457200" algn="just">
+            <a:pPr marL="685800" indent="-457200">
               <a:lnSpc>
                 <a:spcPct val="100000"/>
               </a:lnSpc>
@@ -4882,7 +4749,7 @@
               <a:buAutoNum type="arabicParenR"/>
             </a:pPr>
             <a:r>
-              <a:rPr lang="ru-RU" sz="2200" dirty="0">
+              <a:rPr lang="ru-RU" sz="2600" dirty="0">
                 <a:latin typeface="Times New Roman" panose="02020603050405020304" pitchFamily="18" charset="0"/>
                 <a:ea typeface="Times New Roman" panose="02020603050405020304" pitchFamily="18" charset="0"/>
               </a:rPr>
@@ -4890,7 +4757,7 @@
             </a:r>
           </a:p>
           <a:p>
-            <a:pPr marL="685800" indent="-457200" algn="just">
+            <a:pPr marL="685800" indent="-457200">
               <a:lnSpc>
                 <a:spcPct val="100000"/>
               </a:lnSpc>
@@ -4898,13 +4765,13 @@
               <a:buAutoNum type="arabicParenR"/>
             </a:pPr>
             <a:r>
-              <a:rPr lang="ru-RU" sz="2200" dirty="0">
+              <a:rPr lang="ru-RU" sz="2600" dirty="0">
                 <a:latin typeface="Times New Roman" panose="02020603050405020304" pitchFamily="18" charset="0"/>
                 <a:ea typeface="Times New Roman" panose="02020603050405020304" pitchFamily="18" charset="0"/>
               </a:rPr>
               <a:t>выбрать для них критерии оценки и сравнить.</a:t>
             </a:r>
-            <a:endParaRPr lang="ru-RU" sz="2200" dirty="0">
+            <a:endParaRPr lang="ru-RU" sz="2600" dirty="0">
               <a:effectLst/>
               <a:latin typeface="Times New Roman" panose="02020603050405020304" pitchFamily="18" charset="0"/>
               <a:ea typeface="Times New Roman" panose="02020603050405020304" pitchFamily="18" charset="0"/>
@@ -5045,11 +4912,11 @@
               <a:buNone/>
             </a:pPr>
             <a:r>
-              <a:rPr lang="ru-RU" sz="2200" dirty="0">
+              <a:rPr lang="ru-RU" sz="2600" dirty="0">
                 <a:latin typeface="Times New Roman" panose="02020603050405020304" pitchFamily="18" charset="0"/>
                 <a:cs typeface="Times New Roman" panose="02020603050405020304" pitchFamily="18" charset="0"/>
               </a:rPr>
-              <a:t>Пользовательская активность это любые действия совершаемые пользователем при взаимодействии с интерфейсом программы (движение курсора мыши, нажатие клавиш мыши, нажатие клавиш клавиатуры и т.д.), и их характеристики (координаты курсора, частота нажатия, используемые клавиши и т.д.).</a:t>
+              <a:t>Пользовательская активность это действия совершаемые пользователем при взаимодействии с интерфейсом программы (движение курсора мыши, нажатие клавиш мыши, нажатие клавиш клавиатуры и т.д.), и их характеристики (координаты курсора, частота нажатия, используемые клавиши и т.д.).</a:t>
             </a:r>
           </a:p>
           <a:p>
@@ -5057,24 +4924,7 @@
               <a:buNone/>
             </a:pPr>
             <a:r>
-              <a:rPr lang="ru-RU" sz="2200" dirty="0">
-                <a:solidFill>
-                  <a:schemeClr val="bg1">
-                    <a:lumMod val="50000"/>
-                  </a:schemeClr>
-                </a:solidFill>
-                <a:latin typeface="Times New Roman" panose="02020603050405020304" pitchFamily="18" charset="0"/>
-                <a:cs typeface="Times New Roman" panose="02020603050405020304" pitchFamily="18" charset="0"/>
-              </a:rPr>
-              <a:t>Пользовательская активность это действия совершаемые пользователем посредством взаимодействия с графическим интерфейсом программы.</a:t>
-            </a:r>
-          </a:p>
-          <a:p>
-            <a:pPr marL="0" indent="0">
-              <a:buNone/>
-            </a:pPr>
-            <a:r>
-              <a:rPr lang="ru-RU" sz="2200" dirty="0">
+              <a:rPr lang="ru-RU" sz="2600" dirty="0">
                 <a:latin typeface="Times New Roman" panose="02020603050405020304" pitchFamily="18" charset="0"/>
                 <a:cs typeface="Times New Roman" panose="02020603050405020304" pitchFamily="18" charset="0"/>
               </a:rPr>
@@ -5087,20 +4937,20 @@
               <a:buAutoNum type="arabicParenR"/>
             </a:pPr>
             <a:r>
-              <a:rPr lang="ru-RU" sz="2200" dirty="0">
+              <a:rPr lang="ru-RU" sz="2600" dirty="0">
                 <a:latin typeface="Times New Roman" panose="02020603050405020304" pitchFamily="18" charset="0"/>
                 <a:cs typeface="Times New Roman" panose="02020603050405020304" pitchFamily="18" charset="0"/>
               </a:rPr>
               <a:t>сбор данных о пользовательской активности</a:t>
             </a:r>
             <a:r>
-              <a:rPr lang="en-US" sz="2200" dirty="0">
+              <a:rPr lang="en-US" sz="2600" dirty="0">
                 <a:latin typeface="Times New Roman" panose="02020603050405020304" pitchFamily="18" charset="0"/>
                 <a:cs typeface="Times New Roman" panose="02020603050405020304" pitchFamily="18" charset="0"/>
               </a:rPr>
               <a:t>;</a:t>
             </a:r>
-            <a:endParaRPr lang="ru-RU" sz="2200" dirty="0">
+            <a:endParaRPr lang="ru-RU" sz="2600" dirty="0">
               <a:latin typeface="Times New Roman" panose="02020603050405020304" pitchFamily="18" charset="0"/>
               <a:cs typeface="Times New Roman" panose="02020603050405020304" pitchFamily="18" charset="0"/>
             </a:endParaRPr>
@@ -5111,7 +4961,7 @@
               <a:buAutoNum type="arabicParenR"/>
             </a:pPr>
             <a:r>
-              <a:rPr lang="ru-RU" sz="2200" dirty="0">
+              <a:rPr lang="ru-RU" sz="2600" dirty="0">
                 <a:latin typeface="Times New Roman" panose="02020603050405020304" pitchFamily="18" charset="0"/>
                 <a:cs typeface="Times New Roman" panose="02020603050405020304" pitchFamily="18" charset="0"/>
               </a:rPr>
@@ -5198,7 +5048,7 @@
         <p:spPr>
           <a:xfrm>
             <a:off x="428017" y="-72232"/>
-            <a:ext cx="10515600" cy="1325563"/>
+            <a:ext cx="7366577" cy="1325563"/>
           </a:xfrm>
         </p:spPr>
         <p:txBody>
@@ -5208,14 +5058,8 @@
           <a:lstStyle/>
           <a:p>
             <a:r>
-              <a:rPr lang="ru-RU" sz="4000" b="1" dirty="0">
-                <a:solidFill>
-                  <a:schemeClr val="bg1">
-                    <a:lumMod val="50000"/>
-                  </a:schemeClr>
-                </a:solidFill>
-              </a:rPr>
-              <a:t>Шаблоны поведения пользователя</a:t>
+              <a:rPr lang="ru-RU" sz="4000" b="1" dirty="0"/>
+              <a:t>Математическая модель пользовательской активности ПО</a:t>
             </a:r>
           </a:p>
         </p:txBody>
@@ -5239,7 +5083,7 @@
         <p:spPr>
           <a:xfrm>
             <a:off x="428017" y="1253331"/>
-            <a:ext cx="11182378" cy="5168894"/>
+            <a:ext cx="11182378" cy="5468144"/>
           </a:xfrm>
         </p:spPr>
         <p:txBody>
@@ -5248,197 +5092,324 @@
           </a:bodyPr>
           <a:lstStyle/>
           <a:p>
-            <a:pPr marL="685800" indent="-457200" algn="just">
-              <a:lnSpc>
-                <a:spcPct val="100000"/>
-              </a:lnSpc>
-            </a:pPr>
-            <a:r>
-              <a:rPr lang="ru-RU" sz="2200" dirty="0">
-                <a:solidFill>
-                  <a:schemeClr val="bg1">
-                    <a:lumMod val="50000"/>
-                  </a:schemeClr>
-                </a:solidFill>
-                <a:latin typeface="Times New Roman" panose="02020603050405020304" pitchFamily="18" charset="0"/>
-                <a:ea typeface="Times New Roman" panose="02020603050405020304" pitchFamily="18" charset="0"/>
-              </a:rPr>
-              <a:t>часто повторяемые одинаковые последовательности действий;</a:t>
-            </a:r>
-          </a:p>
-          <a:p>
-            <a:pPr marL="685800" indent="-457200" algn="just">
-              <a:lnSpc>
-                <a:spcPct val="100000"/>
-              </a:lnSpc>
-            </a:pPr>
-            <a:r>
-              <a:rPr lang="ru-RU" sz="2200" dirty="0">
-                <a:solidFill>
-                  <a:schemeClr val="bg1">
-                    <a:lumMod val="50000"/>
-                  </a:schemeClr>
-                </a:solidFill>
-                <a:latin typeface="Times New Roman" panose="02020603050405020304" pitchFamily="18" charset="0"/>
-                <a:ea typeface="Times New Roman" panose="02020603050405020304" pitchFamily="18" charset="0"/>
-              </a:rPr>
-              <a:t>отмена действия сразу после его выполнения;</a:t>
-            </a:r>
-          </a:p>
-          <a:p>
-            <a:pPr marL="685800" indent="-457200" algn="just">
-              <a:lnSpc>
-                <a:spcPct val="100000"/>
-              </a:lnSpc>
-            </a:pPr>
-            <a:r>
-              <a:rPr lang="ru-RU" sz="2200" dirty="0">
-                <a:solidFill>
-                  <a:schemeClr val="bg1">
-                    <a:lumMod val="50000"/>
-                  </a:schemeClr>
-                </a:solidFill>
-                <a:latin typeface="Times New Roman" panose="02020603050405020304" pitchFamily="18" charset="0"/>
-                <a:ea typeface="Times New Roman" panose="02020603050405020304" pitchFamily="18" charset="0"/>
-              </a:rPr>
-              <a:t>частое повторение простых действий (например, клики мыши или нажатие клавиш).</a:t>
-            </a:r>
-            <a:endParaRPr lang="ru-RU" sz="2200" dirty="0">
-              <a:latin typeface="Times New Roman" panose="02020603050405020304" pitchFamily="18" charset="0"/>
-              <a:cs typeface="Times New Roman" panose="02020603050405020304" pitchFamily="18" charset="0"/>
-            </a:endParaRPr>
-          </a:p>
-          <a:p>
-            <a:pPr marL="0" indent="0">
-              <a:buNone/>
-            </a:pPr>
-            <a:r>
-              <a:rPr lang="ru-RU" sz="2200" dirty="0">
-                <a:solidFill>
-                  <a:schemeClr val="bg1">
-                    <a:lumMod val="85000"/>
-                  </a:schemeClr>
-                </a:solidFill>
-                <a:latin typeface="Times New Roman" panose="02020603050405020304" pitchFamily="18" charset="0"/>
-                <a:cs typeface="Times New Roman" panose="02020603050405020304" pitchFamily="18" charset="0"/>
-              </a:rPr>
-              <a:t>Последовательный шаблон это несколько событий связанных друг с другом во времени.</a:t>
-            </a:r>
-            <a:endParaRPr lang="ru-RU" sz="2200" dirty="0">
-              <a:solidFill>
-                <a:schemeClr val="bg1">
-                  <a:lumMod val="85000"/>
-                </a:schemeClr>
-              </a:solidFill>
-              <a:latin typeface="Times New Roman" panose="02020603050405020304" pitchFamily="18" charset="0"/>
-              <a:ea typeface="Times New Roman" panose="02020603050405020304" pitchFamily="18" charset="0"/>
-            </a:endParaRPr>
-          </a:p>
-          <a:p>
-            <a:pPr indent="0" algn="just">
+            <a:pPr indent="0">
               <a:lnSpc>
                 <a:spcPct val="100000"/>
               </a:lnSpc>
               <a:buNone/>
             </a:pPr>
             <a:r>
-              <a:rPr lang="ru-RU" sz="2200" dirty="0">
-                <a:solidFill>
-                  <a:schemeClr val="bg1">
-                    <a:lumMod val="50000"/>
-                  </a:schemeClr>
-                </a:solidFill>
+              <a:rPr lang="ru-RU" sz="2600" dirty="0">
                 <a:latin typeface="Times New Roman" panose="02020603050405020304" pitchFamily="18" charset="0"/>
                 <a:ea typeface="Times New Roman" panose="02020603050405020304" pitchFamily="18" charset="0"/>
-              </a:rPr>
-              <a:t>Более простые индикаторы:</a:t>
-            </a:r>
-            <a:endParaRPr lang="ru-RU" sz="2200" dirty="0">
-              <a:solidFill>
-                <a:schemeClr val="bg1">
-                  <a:lumMod val="50000"/>
-                </a:schemeClr>
-              </a:solidFill>
-              <a:effectLst/>
+                <a:cs typeface="Times New Roman" panose="02020603050405020304" pitchFamily="18" charset="0"/>
+              </a:rPr>
+              <a:t>Сессия – последовательность действий пользователя за фиксированный временной промежуток.</a:t>
+            </a:r>
+            <a:endParaRPr lang="en-US" sz="2600" dirty="0">
               <a:latin typeface="Times New Roman" panose="02020603050405020304" pitchFamily="18" charset="0"/>
               <a:ea typeface="Times New Roman" panose="02020603050405020304" pitchFamily="18" charset="0"/>
+              <a:cs typeface="Times New Roman" panose="02020603050405020304" pitchFamily="18" charset="0"/>
             </a:endParaRPr>
           </a:p>
           <a:p>
-            <a:pPr marL="685800" indent="-457200" algn="just">
+            <a:pPr indent="0">
               <a:lnSpc>
                 <a:spcPct val="100000"/>
               </a:lnSpc>
+              <a:buNone/>
             </a:pPr>
             <a:r>
-              <a:rPr lang="ru-RU" sz="2200" dirty="0">
-                <a:solidFill>
-                  <a:schemeClr val="bg1">
-                    <a:lumMod val="50000"/>
-                  </a:schemeClr>
-                </a:solidFill>
+              <a:rPr lang="ru-RU" sz="2600" dirty="0">
                 <a:latin typeface="Times New Roman" panose="02020603050405020304" pitchFamily="18" charset="0"/>
                 <a:ea typeface="Times New Roman" panose="02020603050405020304" pitchFamily="18" charset="0"/>
-              </a:rPr>
-              <a:t>количество вызовов онлайн-справки;</a:t>
-            </a:r>
-          </a:p>
-          <a:p>
-            <a:pPr marL="685800" indent="-457200" algn="just">
+                <a:cs typeface="Times New Roman" panose="02020603050405020304" pitchFamily="18" charset="0"/>
+              </a:rPr>
+              <a:t>Шаблон – предопределенная последовательность событий.</a:t>
+            </a:r>
+          </a:p>
+          <a:p>
+            <a:pPr indent="0">
               <a:lnSpc>
                 <a:spcPct val="100000"/>
               </a:lnSpc>
+              <a:buNone/>
             </a:pPr>
             <a:r>
-              <a:rPr lang="ru-RU" sz="2200" dirty="0">
-                <a:solidFill>
-                  <a:schemeClr val="bg1">
-                    <a:lumMod val="50000"/>
-                  </a:schemeClr>
-                </a:solidFill>
+              <a:rPr lang="ru-RU" sz="2600" dirty="0">
                 <a:latin typeface="Times New Roman" panose="02020603050405020304" pitchFamily="18" charset="0"/>
                 <a:ea typeface="Times New Roman" panose="02020603050405020304" pitchFamily="18" charset="0"/>
-              </a:rPr>
-              <a:t>количество действий отмены;</a:t>
-            </a:r>
-          </a:p>
-          <a:p>
-            <a:pPr marL="685800" indent="-457200" algn="just">
+                <a:cs typeface="Times New Roman" panose="02020603050405020304" pitchFamily="18" charset="0"/>
+              </a:rPr>
+              <a:t>Поддержка шаблона</a:t>
+            </a:r>
+            <a:r>
+              <a:rPr lang="en-US" sz="2600" dirty="0">
+                <a:latin typeface="Times New Roman" panose="02020603050405020304" pitchFamily="18" charset="0"/>
+                <a:ea typeface="Times New Roman" panose="02020603050405020304" pitchFamily="18" charset="0"/>
+                <a:cs typeface="Times New Roman" panose="02020603050405020304" pitchFamily="18" charset="0"/>
+              </a:rPr>
+              <a:t> </a:t>
+            </a:r>
+            <a:r>
+              <a:rPr lang="ru-RU" sz="2600" dirty="0">
+                <a:latin typeface="Times New Roman" panose="02020603050405020304" pitchFamily="18" charset="0"/>
+                <a:ea typeface="Times New Roman" panose="02020603050405020304" pitchFamily="18" charset="0"/>
+                <a:cs typeface="Times New Roman" panose="02020603050405020304" pitchFamily="18" charset="0"/>
+              </a:rPr>
+              <a:t>сессией</a:t>
+            </a:r>
+            <a:r>
+              <a:rPr lang="en-US" sz="2600" dirty="0">
+                <a:latin typeface="Times New Roman" panose="02020603050405020304" pitchFamily="18" charset="0"/>
+                <a:ea typeface="Times New Roman" panose="02020603050405020304" pitchFamily="18" charset="0"/>
+                <a:cs typeface="Times New Roman" panose="02020603050405020304" pitchFamily="18" charset="0"/>
+              </a:rPr>
+              <a:t> </a:t>
+            </a:r>
+            <a:r>
+              <a:rPr lang="ru-RU" sz="2600" dirty="0">
+                <a:latin typeface="Times New Roman" panose="02020603050405020304" pitchFamily="18" charset="0"/>
+                <a:ea typeface="Times New Roman" panose="02020603050405020304" pitchFamily="18" charset="0"/>
+                <a:cs typeface="Times New Roman" panose="02020603050405020304" pitchFamily="18" charset="0"/>
+              </a:rPr>
+              <a:t>– процент содержания этого шаблона в данной сессии.</a:t>
+            </a:r>
+          </a:p>
+          <a:p>
+            <a:pPr indent="0">
               <a:lnSpc>
                 <a:spcPct val="100000"/>
               </a:lnSpc>
+              <a:buNone/>
             </a:pPr>
             <a:r>
-              <a:rPr lang="ru-RU" sz="2200" dirty="0">
-                <a:solidFill>
-                  <a:schemeClr val="bg1">
-                    <a:lumMod val="50000"/>
-                  </a:schemeClr>
-                </a:solidFill>
+              <a:rPr lang="ru-RU" sz="2600" dirty="0">
                 <a:latin typeface="Times New Roman" panose="02020603050405020304" pitchFamily="18" charset="0"/>
                 <a:ea typeface="Times New Roman" panose="02020603050405020304" pitchFamily="18" charset="0"/>
-              </a:rPr>
-              <a:t>частое открытие-закрытие выпадающих списков;</a:t>
-            </a:r>
-          </a:p>
-          <a:p>
-            <a:pPr marL="685800" indent="-457200" algn="just">
+                <a:cs typeface="Times New Roman" panose="02020603050405020304" pitchFamily="18" charset="0"/>
+              </a:rPr>
+              <a:t>Например, пусть имеется сессия </a:t>
+            </a:r>
+            <a:r>
+              <a:rPr lang="ru-RU" sz="2600" b="0" i="0" u="none" strike="noStrike" baseline="0" dirty="0">
+                <a:latin typeface="Times New Roman" panose="02020603050405020304" pitchFamily="18" charset="0"/>
+                <a:cs typeface="Times New Roman" panose="02020603050405020304" pitchFamily="18" charset="0"/>
+              </a:rPr>
+              <a:t>⟨2, 1, 2, 1, 3, 2, 1, 2, 1, 3⟩.</a:t>
+            </a:r>
+            <a:br>
+              <a:rPr lang="en-US" sz="2600" b="0" i="0" u="none" strike="noStrike" baseline="0" dirty="0">
+                <a:latin typeface="Times New Roman" panose="02020603050405020304" pitchFamily="18" charset="0"/>
+                <a:cs typeface="Times New Roman" panose="02020603050405020304" pitchFamily="18" charset="0"/>
+              </a:rPr>
+            </a:br>
+            <a:r>
+              <a:rPr lang="ru-RU" sz="2600" dirty="0">
+                <a:latin typeface="Times New Roman" panose="02020603050405020304" pitchFamily="18" charset="0"/>
+                <a:cs typeface="Times New Roman" panose="02020603050405020304" pitchFamily="18" charset="0"/>
+              </a:rPr>
+              <a:t>Рассчитаем кол-во вхождений (</a:t>
+            </a:r>
+            <a:r>
+              <a:rPr lang="el-GR" sz="2600" dirty="0">
+                <a:latin typeface="Times New Roman" panose="02020603050405020304" pitchFamily="18" charset="0"/>
+                <a:cs typeface="Times New Roman" panose="02020603050405020304" pitchFamily="18" charset="0"/>
+              </a:rPr>
+              <a:t>μ</a:t>
+            </a:r>
+            <a:r>
+              <a:rPr lang="ru-RU" sz="2600" dirty="0">
+                <a:latin typeface="Times New Roman" panose="02020603050405020304" pitchFamily="18" charset="0"/>
+                <a:cs typeface="Times New Roman" panose="02020603050405020304" pitchFamily="18" charset="0"/>
+              </a:rPr>
+              <a:t>) и поддержку (</a:t>
+            </a:r>
+            <a:r>
+              <a:rPr lang="el-GR" sz="2600" dirty="0">
+                <a:latin typeface="Times New Roman" panose="02020603050405020304" pitchFamily="18" charset="0"/>
+                <a:cs typeface="Times New Roman" panose="02020603050405020304" pitchFamily="18" charset="0"/>
+              </a:rPr>
+              <a:t>λ</a:t>
+            </a:r>
+            <a:r>
+              <a:rPr lang="ru-RU" sz="2600" dirty="0">
+                <a:latin typeface="Times New Roman" panose="02020603050405020304" pitchFamily="18" charset="0"/>
+                <a:cs typeface="Times New Roman" panose="02020603050405020304" pitchFamily="18" charset="0"/>
+              </a:rPr>
+              <a:t>) для следующих шаблонов:</a:t>
+            </a:r>
+          </a:p>
+          <a:p>
+            <a:pPr indent="0">
               <a:lnSpc>
                 <a:spcPct val="100000"/>
               </a:lnSpc>
+              <a:buNone/>
             </a:pPr>
             <a:r>
-              <a:rPr lang="ru-RU" sz="2200" dirty="0">
-                <a:solidFill>
-                  <a:schemeClr val="bg1">
-                    <a:lumMod val="50000"/>
-                  </a:schemeClr>
-                </a:solidFill>
-                <a:latin typeface="Times New Roman" panose="02020603050405020304" pitchFamily="18" charset="0"/>
-                <a:ea typeface="Times New Roman" panose="02020603050405020304" pitchFamily="18" charset="0"/>
-              </a:rPr>
-              <a:t>нажатие одной и той же кнопки более одного раза.</a:t>
-            </a:r>
+              <a:rPr lang="en-US" sz="2600" dirty="0">
+                <a:latin typeface="Times New Roman" panose="02020603050405020304" pitchFamily="18" charset="0"/>
+                <a:cs typeface="Times New Roman" panose="02020603050405020304" pitchFamily="18" charset="0"/>
+              </a:rPr>
+              <a:t>p1 = 〈2, 1〉, </a:t>
+            </a:r>
+            <a:r>
+              <a:rPr lang="el-GR" sz="2600" dirty="0">
+                <a:latin typeface="Times New Roman" panose="02020603050405020304" pitchFamily="18" charset="0"/>
+                <a:cs typeface="Times New Roman" panose="02020603050405020304" pitchFamily="18" charset="0"/>
+              </a:rPr>
+              <a:t>μ</a:t>
+            </a:r>
+            <a:r>
+              <a:rPr lang="en-US" sz="2600" dirty="0">
+                <a:latin typeface="Times New Roman" panose="02020603050405020304" pitchFamily="18" charset="0"/>
+                <a:cs typeface="Times New Roman" panose="02020603050405020304" pitchFamily="18" charset="0"/>
+              </a:rPr>
+              <a:t> = 4, </a:t>
+            </a:r>
+            <a:r>
+              <a:rPr lang="el-GR" sz="2600" dirty="0">
+                <a:latin typeface="Times New Roman" panose="02020603050405020304" pitchFamily="18" charset="0"/>
+                <a:cs typeface="Times New Roman" panose="02020603050405020304" pitchFamily="18" charset="0"/>
+              </a:rPr>
+              <a:t>λ</a:t>
+            </a:r>
+            <a:r>
+              <a:rPr lang="en-US" sz="2600" dirty="0">
+                <a:latin typeface="Times New Roman" panose="02020603050405020304" pitchFamily="18" charset="0"/>
+                <a:cs typeface="Times New Roman" panose="02020603050405020304" pitchFamily="18" charset="0"/>
+              </a:rPr>
+              <a:t> = 0.8;</a:t>
+            </a:r>
+            <a:br>
+              <a:rPr lang="ru-RU" sz="2600" dirty="0">
+                <a:latin typeface="Times New Roman" panose="02020603050405020304" pitchFamily="18" charset="0"/>
+                <a:cs typeface="Times New Roman" panose="02020603050405020304" pitchFamily="18" charset="0"/>
+              </a:rPr>
+            </a:br>
+            <a:r>
+              <a:rPr lang="en-US" sz="2600" dirty="0">
+                <a:latin typeface="Times New Roman" panose="02020603050405020304" pitchFamily="18" charset="0"/>
+                <a:cs typeface="Times New Roman" panose="02020603050405020304" pitchFamily="18" charset="0"/>
+              </a:rPr>
+              <a:t>p2 = 〈2, 1, 2, 1〉, </a:t>
+            </a:r>
+            <a:r>
+              <a:rPr lang="el-GR" sz="2600" dirty="0">
+                <a:latin typeface="Times New Roman" panose="02020603050405020304" pitchFamily="18" charset="0"/>
+                <a:cs typeface="Times New Roman" panose="02020603050405020304" pitchFamily="18" charset="0"/>
+              </a:rPr>
+              <a:t>μ</a:t>
+            </a:r>
+            <a:r>
+              <a:rPr lang="en-US" sz="2600" dirty="0">
+                <a:latin typeface="Times New Roman" panose="02020603050405020304" pitchFamily="18" charset="0"/>
+                <a:cs typeface="Times New Roman" panose="02020603050405020304" pitchFamily="18" charset="0"/>
+              </a:rPr>
+              <a:t> = 2, </a:t>
+            </a:r>
+            <a:r>
+              <a:rPr lang="el-GR" sz="2600" dirty="0">
+                <a:latin typeface="Times New Roman" panose="02020603050405020304" pitchFamily="18" charset="0"/>
+                <a:cs typeface="Times New Roman" panose="02020603050405020304" pitchFamily="18" charset="0"/>
+              </a:rPr>
+              <a:t>λ</a:t>
+            </a:r>
+            <a:r>
+              <a:rPr lang="en-US" sz="2600" dirty="0">
+                <a:latin typeface="Times New Roman" panose="02020603050405020304" pitchFamily="18" charset="0"/>
+                <a:cs typeface="Times New Roman" panose="02020603050405020304" pitchFamily="18" charset="0"/>
+              </a:rPr>
+              <a:t> = 0.8;</a:t>
+            </a:r>
+            <a:br>
+              <a:rPr lang="ru-RU" sz="2600" dirty="0">
+                <a:latin typeface="Times New Roman" panose="02020603050405020304" pitchFamily="18" charset="0"/>
+                <a:cs typeface="Times New Roman" panose="02020603050405020304" pitchFamily="18" charset="0"/>
+              </a:rPr>
+            </a:br>
+            <a:r>
+              <a:rPr lang="en-US" sz="2600" dirty="0">
+                <a:latin typeface="Times New Roman" panose="02020603050405020304" pitchFamily="18" charset="0"/>
+                <a:cs typeface="Times New Roman" panose="02020603050405020304" pitchFamily="18" charset="0"/>
+              </a:rPr>
+              <a:t>p3 = 〈2, 1, 2, 1, 3〉, </a:t>
+            </a:r>
+            <a:r>
+              <a:rPr lang="el-GR" sz="2600" dirty="0">
+                <a:latin typeface="Times New Roman" panose="02020603050405020304" pitchFamily="18" charset="0"/>
+                <a:cs typeface="Times New Roman" panose="02020603050405020304" pitchFamily="18" charset="0"/>
+              </a:rPr>
+              <a:t>μ</a:t>
+            </a:r>
+            <a:r>
+              <a:rPr lang="en-US" sz="2600" dirty="0">
+                <a:latin typeface="Times New Roman" panose="02020603050405020304" pitchFamily="18" charset="0"/>
+                <a:cs typeface="Times New Roman" panose="02020603050405020304" pitchFamily="18" charset="0"/>
+              </a:rPr>
+              <a:t> = 2, </a:t>
+            </a:r>
+            <a:r>
+              <a:rPr lang="el-GR" sz="2600" dirty="0">
+                <a:latin typeface="Times New Roman" panose="02020603050405020304" pitchFamily="18" charset="0"/>
+                <a:cs typeface="Times New Roman" panose="02020603050405020304" pitchFamily="18" charset="0"/>
+              </a:rPr>
+              <a:t>λ</a:t>
+            </a:r>
+            <a:r>
+              <a:rPr lang="en-US" sz="2600" dirty="0">
+                <a:latin typeface="Times New Roman" panose="02020603050405020304" pitchFamily="18" charset="0"/>
+                <a:cs typeface="Times New Roman" panose="02020603050405020304" pitchFamily="18" charset="0"/>
+              </a:rPr>
+              <a:t> = 1;</a:t>
+            </a:r>
+            <a:br>
+              <a:rPr lang="ru-RU" sz="2600" dirty="0">
+                <a:latin typeface="Times New Roman" panose="02020603050405020304" pitchFamily="18" charset="0"/>
+                <a:cs typeface="Times New Roman" panose="02020603050405020304" pitchFamily="18" charset="0"/>
+              </a:rPr>
+            </a:br>
+            <a:r>
+              <a:rPr lang="en-US" sz="2600" dirty="0">
+                <a:latin typeface="Times New Roman" panose="02020603050405020304" pitchFamily="18" charset="0"/>
+                <a:cs typeface="Times New Roman" panose="02020603050405020304" pitchFamily="18" charset="0"/>
+              </a:rPr>
+              <a:t>p4 = 〈3, 2, 1, 2, 1〉, </a:t>
+            </a:r>
+            <a:r>
+              <a:rPr lang="el-GR" sz="2600" dirty="0">
+                <a:latin typeface="Times New Roman" panose="02020603050405020304" pitchFamily="18" charset="0"/>
+                <a:cs typeface="Times New Roman" panose="02020603050405020304" pitchFamily="18" charset="0"/>
+              </a:rPr>
+              <a:t>μ</a:t>
+            </a:r>
+            <a:r>
+              <a:rPr lang="en-US" sz="2600" dirty="0">
+                <a:latin typeface="Times New Roman" panose="02020603050405020304" pitchFamily="18" charset="0"/>
+                <a:cs typeface="Times New Roman" panose="02020603050405020304" pitchFamily="18" charset="0"/>
+              </a:rPr>
+              <a:t> = 1, </a:t>
+            </a:r>
+            <a:r>
+              <a:rPr lang="el-GR" sz="2600" dirty="0">
+                <a:latin typeface="Times New Roman" panose="02020603050405020304" pitchFamily="18" charset="0"/>
+                <a:cs typeface="Times New Roman" panose="02020603050405020304" pitchFamily="18" charset="0"/>
+              </a:rPr>
+              <a:t>λ</a:t>
+            </a:r>
+            <a:r>
+              <a:rPr lang="en-US" sz="2600" dirty="0">
+                <a:latin typeface="Times New Roman" panose="02020603050405020304" pitchFamily="18" charset="0"/>
+                <a:cs typeface="Times New Roman" panose="02020603050405020304" pitchFamily="18" charset="0"/>
+              </a:rPr>
+              <a:t> = 0.5.</a:t>
+            </a:r>
+            <a:endParaRPr lang="ru-RU" sz="2600" b="0" i="1" dirty="0">
+              <a:latin typeface="Cambria Math" panose="02040503050406030204" pitchFamily="18" charset="0"/>
+              <a:ea typeface="Cambria Math" panose="02040503050406030204" pitchFamily="18" charset="0"/>
+              <a:cs typeface="Times New Roman" panose="02020603050405020304" pitchFamily="18" charset="0"/>
+            </a:endParaRPr>
           </a:p>
         </p:txBody>
       </p:sp>
@@ -5474,7 +5445,7 @@
     </p:spTree>
     <p:extLst>
       <p:ext uri="{BB962C8B-B14F-4D97-AF65-F5344CB8AC3E}">
-        <p14:creationId xmlns:p14="http://schemas.microsoft.com/office/powerpoint/2010/main" val="27859665"/>
+        <p14:creationId xmlns:p14="http://schemas.microsoft.com/office/powerpoint/2010/main" val="3938674021"/>
       </p:ext>
     </p:extLst>
   </p:cSld>
@@ -5485,1018 +5456,6 @@
 </file>
 
 <file path=ppt/slides/slide5.xml><?xml version="1.0" encoding="utf-8"?>
-<p:sld xmlns:a="http://schemas.openxmlformats.org/drawingml/2006/main" xmlns:r="http://schemas.openxmlformats.org/officeDocument/2006/relationships" xmlns:p="http://schemas.openxmlformats.org/presentationml/2006/main">
-  <p:cSld>
-    <p:spTree>
-      <p:nvGrpSpPr>
-        <p:cNvPr id="1" name=""/>
-        <p:cNvGrpSpPr/>
-        <p:nvPr/>
-      </p:nvGrpSpPr>
-      <p:grpSpPr>
-        <a:xfrm>
-          <a:off x="0" y="0"/>
-          <a:ext cx="0" cy="0"/>
-          <a:chOff x="0" y="0"/>
-          <a:chExt cx="0" cy="0"/>
-        </a:xfrm>
-      </p:grpSpPr>
-      <p:sp>
-        <p:nvSpPr>
-          <p:cNvPr id="2" name="Заголовок 1">
-            <a:extLst>
-              <a:ext uri="{FF2B5EF4-FFF2-40B4-BE49-F238E27FC236}">
-                <a16:creationId xmlns:a16="http://schemas.microsoft.com/office/drawing/2014/main" id="{1802D59D-6A83-151A-EEA2-678960399BE4}"/>
-              </a:ext>
-            </a:extLst>
-          </p:cNvPr>
-          <p:cNvSpPr>
-            <a:spLocks noGrp="1"/>
-          </p:cNvSpPr>
-          <p:nvPr>
-            <p:ph type="title"/>
-          </p:nvPr>
-        </p:nvSpPr>
-        <p:spPr>
-          <a:xfrm>
-            <a:off x="428017" y="-72232"/>
-            <a:ext cx="7366577" cy="1325563"/>
-          </a:xfrm>
-        </p:spPr>
-        <p:txBody>
-          <a:bodyPr>
-            <a:normAutofit/>
-          </a:bodyPr>
-          <a:lstStyle/>
-          <a:p>
-            <a:r>
-              <a:rPr lang="ru-RU" sz="4000" b="1" dirty="0"/>
-              <a:t>Математическая модель пользовательской активности ПО</a:t>
-            </a:r>
-          </a:p>
-        </p:txBody>
-      </p:sp>
-      <mc:AlternateContent xmlns:mc="http://schemas.openxmlformats.org/markup-compatibility/2006" xmlns:a14="http://schemas.microsoft.com/office/drawing/2010/main">
-        <mc:Choice Requires="a14">
-          <p:sp>
-            <p:nvSpPr>
-              <p:cNvPr id="3" name="Объект 2">
-                <a:extLst>
-                  <a:ext uri="{FF2B5EF4-FFF2-40B4-BE49-F238E27FC236}">
-                    <a16:creationId xmlns:a16="http://schemas.microsoft.com/office/drawing/2014/main" id="{68541323-2632-074C-E69F-FC80AB230174}"/>
-                  </a:ext>
-                </a:extLst>
-              </p:cNvPr>
-              <p:cNvSpPr>
-                <a:spLocks noGrp="1"/>
-              </p:cNvSpPr>
-              <p:nvPr>
-                <p:ph idx="1"/>
-              </p:nvPr>
-            </p:nvSpPr>
-            <p:spPr>
-              <a:xfrm>
-                <a:off x="428017" y="1253331"/>
-                <a:ext cx="11182378" cy="5168894"/>
-              </a:xfrm>
-            </p:spPr>
-            <p:txBody>
-              <a:bodyPr>
-                <a:noAutofit/>
-              </a:bodyPr>
-              <a:lstStyle/>
-              <a:p>
-                <a:pPr indent="0">
-                  <a:lnSpc>
-                    <a:spcPct val="100000"/>
-                  </a:lnSpc>
-                  <a:buNone/>
-                </a:pPr>
-                <a:r>
-                  <a:rPr lang="ru-RU" sz="2200" dirty="0">
-                    <a:latin typeface="Times New Roman" panose="02020603050405020304" pitchFamily="18" charset="0"/>
-                    <a:ea typeface="Times New Roman" panose="02020603050405020304" pitchFamily="18" charset="0"/>
-                    <a:cs typeface="Times New Roman" panose="02020603050405020304" pitchFamily="18" charset="0"/>
-                  </a:rPr>
-                  <a:t>Сессия – зафиксированный временной промежуток, в течение которого пользователь взаимодействовал с программной системой.</a:t>
-                </a:r>
-                <a:endParaRPr lang="en-US" sz="2200" dirty="0">
-                  <a:latin typeface="Times New Roman" panose="02020603050405020304" pitchFamily="18" charset="0"/>
-                  <a:ea typeface="Times New Roman" panose="02020603050405020304" pitchFamily="18" charset="0"/>
-                  <a:cs typeface="Times New Roman" panose="02020603050405020304" pitchFamily="18" charset="0"/>
-                </a:endParaRPr>
-              </a:p>
-              <a:p>
-                <a:pPr indent="0">
-                  <a:lnSpc>
-                    <a:spcPct val="100000"/>
-                  </a:lnSpc>
-                  <a:buNone/>
-                </a:pPr>
-                <a:r>
-                  <a:rPr lang="ru-RU" sz="2200" dirty="0">
-                    <a:latin typeface="Times New Roman" panose="02020603050405020304" pitchFamily="18" charset="0"/>
-                    <a:ea typeface="Times New Roman" panose="02020603050405020304" pitchFamily="18" charset="0"/>
-                    <a:cs typeface="Times New Roman" panose="02020603050405020304" pitchFamily="18" charset="0"/>
-                  </a:rPr>
-                  <a:t>Шаблон – последовательность событий.</a:t>
-                </a:r>
-              </a:p>
-              <a:p>
-                <a:pPr indent="0">
-                  <a:lnSpc>
-                    <a:spcPct val="100000"/>
-                  </a:lnSpc>
-                  <a:buNone/>
-                </a:pPr>
-                <a:r>
-                  <a:rPr lang="ru-RU" sz="2200" dirty="0">
-                    <a:latin typeface="Times New Roman" panose="02020603050405020304" pitchFamily="18" charset="0"/>
-                    <a:ea typeface="Times New Roman" panose="02020603050405020304" pitchFamily="18" charset="0"/>
-                    <a:cs typeface="Times New Roman" panose="02020603050405020304" pitchFamily="18" charset="0"/>
-                  </a:rPr>
-                  <a:t>Поддержка шаблона</a:t>
-                </a:r>
-                <a:r>
-                  <a:rPr lang="en-US" sz="2200" dirty="0">
-                    <a:latin typeface="Times New Roman" panose="02020603050405020304" pitchFamily="18" charset="0"/>
-                    <a:ea typeface="Times New Roman" panose="02020603050405020304" pitchFamily="18" charset="0"/>
-                    <a:cs typeface="Times New Roman" panose="02020603050405020304" pitchFamily="18" charset="0"/>
-                  </a:rPr>
-                  <a:t> </a:t>
-                </a:r>
-                <a14:m>
-                  <m:oMath xmlns:m="http://schemas.openxmlformats.org/officeDocument/2006/math">
-                    <m:r>
-                      <a:rPr lang="en-US" sz="2200" i="1">
-                        <a:latin typeface="Cambria Math" panose="02040503050406030204" pitchFamily="18" charset="0"/>
-                        <a:ea typeface="Cambria Math" panose="02040503050406030204" pitchFamily="18" charset="0"/>
-                        <a:cs typeface="Times New Roman" panose="02020603050405020304" pitchFamily="18" charset="0"/>
-                      </a:rPr>
-                      <m:t>𝑝</m:t>
-                    </m:r>
-                  </m:oMath>
-                </a14:m>
-                <a:r>
-                  <a:rPr lang="ru-RU" sz="2200" dirty="0">
-                    <a:latin typeface="Times New Roman" panose="02020603050405020304" pitchFamily="18" charset="0"/>
-                    <a:ea typeface="Times New Roman" panose="02020603050405020304" pitchFamily="18" charset="0"/>
-                    <a:cs typeface="Times New Roman" panose="02020603050405020304" pitchFamily="18" charset="0"/>
-                  </a:rPr>
-                  <a:t> сессией</a:t>
-                </a:r>
-                <a:r>
-                  <a:rPr lang="en-US" sz="2200" dirty="0">
-                    <a:latin typeface="Times New Roman" panose="02020603050405020304" pitchFamily="18" charset="0"/>
-                    <a:ea typeface="Times New Roman" panose="02020603050405020304" pitchFamily="18" charset="0"/>
-                    <a:cs typeface="Times New Roman" panose="02020603050405020304" pitchFamily="18" charset="0"/>
-                  </a:rPr>
-                  <a:t> </a:t>
-                </a:r>
-                <a14:m>
-                  <m:oMath xmlns:m="http://schemas.openxmlformats.org/officeDocument/2006/math">
-                    <m:sSup>
-                      <m:sSupPr>
-                        <m:ctrlPr>
-                          <a:rPr lang="en-US" sz="2200" i="1">
-                            <a:latin typeface="Cambria Math" panose="02040503050406030204" pitchFamily="18" charset="0"/>
-                            <a:ea typeface="Cambria Math" panose="02040503050406030204" pitchFamily="18" charset="0"/>
-                            <a:cs typeface="Times New Roman" panose="02020603050405020304" pitchFamily="18" charset="0"/>
-                          </a:rPr>
-                        </m:ctrlPr>
-                      </m:sSupPr>
-                      <m:e>
-                        <m:r>
-                          <a:rPr lang="en-US" sz="2200" i="1">
-                            <a:latin typeface="Cambria Math" panose="02040503050406030204" pitchFamily="18" charset="0"/>
-                            <a:ea typeface="Cambria Math" panose="02040503050406030204" pitchFamily="18" charset="0"/>
-                            <a:cs typeface="Times New Roman" panose="02020603050405020304" pitchFamily="18" charset="0"/>
-                          </a:rPr>
-                          <m:t>𝑠</m:t>
-                        </m:r>
-                      </m:e>
-                      <m:sup>
-                        <m:r>
-                          <a:rPr lang="en-US" sz="2200" i="1">
-                            <a:latin typeface="Cambria Math" panose="02040503050406030204" pitchFamily="18" charset="0"/>
-                            <a:ea typeface="Cambria Math" panose="02040503050406030204" pitchFamily="18" charset="0"/>
-                            <a:cs typeface="Times New Roman" panose="02020603050405020304" pitchFamily="18" charset="0"/>
-                          </a:rPr>
-                          <m:t>′</m:t>
-                        </m:r>
-                      </m:sup>
-                    </m:sSup>
-                  </m:oMath>
-                </a14:m>
-                <a:r>
-                  <a:rPr lang="ru-RU" sz="2200" dirty="0">
-                    <a:latin typeface="Times New Roman" panose="02020603050405020304" pitchFamily="18" charset="0"/>
-                    <a:ea typeface="Times New Roman" panose="02020603050405020304" pitchFamily="18" charset="0"/>
-                    <a:cs typeface="Times New Roman" panose="02020603050405020304" pitchFamily="18" charset="0"/>
-                  </a:rPr>
-                  <a:t> – процент содержания этого шаблона в данной сессии.</a:t>
-                </a:r>
-                <a:br>
-                  <a:rPr lang="en-US" sz="2200" dirty="0">
-                    <a:latin typeface="Times New Roman" panose="02020603050405020304" pitchFamily="18" charset="0"/>
-                    <a:ea typeface="Times New Roman" panose="02020603050405020304" pitchFamily="18" charset="0"/>
-                    <a:cs typeface="Times New Roman" panose="02020603050405020304" pitchFamily="18" charset="0"/>
-                  </a:rPr>
-                </a:br>
-                <a14:m>
-                  <m:oMath xmlns:m="http://schemas.openxmlformats.org/officeDocument/2006/math">
-                    <m:sSubSup>
-                      <m:sSubSupPr>
-                        <m:ctrlPr>
-                          <a:rPr lang="ru-RU" sz="2200" i="1">
-                            <a:latin typeface="Cambria Math" panose="02040503050406030204" pitchFamily="18" charset="0"/>
-                            <a:ea typeface="Cambria Math" panose="02040503050406030204" pitchFamily="18" charset="0"/>
-                            <a:cs typeface="Times New Roman" panose="02020603050405020304" pitchFamily="18" charset="0"/>
-                          </a:rPr>
-                        </m:ctrlPr>
-                      </m:sSubSupPr>
-                      <m:e>
-                        <m:r>
-                          <a:rPr lang="ru-RU" sz="2200" i="1">
-                            <a:latin typeface="Cambria Math" panose="02040503050406030204" pitchFamily="18" charset="0"/>
-                            <a:ea typeface="Cambria Math" panose="02040503050406030204" pitchFamily="18" charset="0"/>
-                            <a:cs typeface="Times New Roman" panose="02020603050405020304" pitchFamily="18" charset="0"/>
-                          </a:rPr>
-                          <m:t>𝜆</m:t>
-                        </m:r>
-                      </m:e>
-                      <m:sub>
-                        <m:r>
-                          <a:rPr lang="en-US" sz="2200" i="1">
-                            <a:latin typeface="Cambria Math" panose="02040503050406030204" pitchFamily="18" charset="0"/>
-                            <a:ea typeface="Cambria Math" panose="02040503050406030204" pitchFamily="18" charset="0"/>
-                            <a:cs typeface="Times New Roman" panose="02020603050405020304" pitchFamily="18" charset="0"/>
-                          </a:rPr>
-                          <m:t>𝑝</m:t>
-                        </m:r>
-                      </m:sub>
-                      <m:sup>
-                        <m:r>
-                          <a:rPr lang="en-US" sz="2200" i="1">
-                            <a:latin typeface="Cambria Math" panose="02040503050406030204" pitchFamily="18" charset="0"/>
-                            <a:ea typeface="Cambria Math" panose="02040503050406030204" pitchFamily="18" charset="0"/>
-                            <a:cs typeface="Times New Roman" panose="02020603050405020304" pitchFamily="18" charset="0"/>
-                          </a:rPr>
-                          <m:t>𝑠</m:t>
-                        </m:r>
-                        <m:r>
-                          <a:rPr lang="en-US" sz="2200" i="1">
-                            <a:latin typeface="Cambria Math" panose="02040503050406030204" pitchFamily="18" charset="0"/>
-                            <a:ea typeface="Cambria Math" panose="02040503050406030204" pitchFamily="18" charset="0"/>
-                            <a:cs typeface="Times New Roman" panose="02020603050405020304" pitchFamily="18" charset="0"/>
-                          </a:rPr>
-                          <m:t>′</m:t>
-                        </m:r>
-                      </m:sup>
-                    </m:sSubSup>
-                    <m:r>
-                      <a:rPr lang="ru-RU" sz="2200" i="1">
-                        <a:latin typeface="Cambria Math" panose="02040503050406030204" pitchFamily="18" charset="0"/>
-                        <a:ea typeface="Cambria Math" panose="02040503050406030204" pitchFamily="18" charset="0"/>
-                        <a:cs typeface="Times New Roman" panose="02020603050405020304" pitchFamily="18" charset="0"/>
-                      </a:rPr>
-                      <m:t>=</m:t>
-                    </m:r>
-                    <m:f>
-                      <m:fPr>
-                        <m:ctrlPr>
-                          <a:rPr lang="ru-RU" sz="2200" i="1">
-                            <a:latin typeface="Cambria Math" panose="02040503050406030204" pitchFamily="18" charset="0"/>
-                            <a:ea typeface="Cambria Math" panose="02040503050406030204" pitchFamily="18" charset="0"/>
-                            <a:cs typeface="Times New Roman" panose="02020603050405020304" pitchFamily="18" charset="0"/>
-                          </a:rPr>
-                        </m:ctrlPr>
-                      </m:fPr>
-                      <m:num>
-                        <m:sSubSup>
-                          <m:sSubSupPr>
-                            <m:ctrlPr>
-                              <a:rPr lang="ru-RU" sz="2200" i="1">
-                                <a:latin typeface="Cambria Math" panose="02040503050406030204" pitchFamily="18" charset="0"/>
-                                <a:ea typeface="Cambria Math" panose="02040503050406030204" pitchFamily="18" charset="0"/>
-                                <a:cs typeface="Times New Roman" panose="02020603050405020304" pitchFamily="18" charset="0"/>
-                              </a:rPr>
-                            </m:ctrlPr>
-                          </m:sSubSupPr>
-                          <m:e>
-                            <m:r>
-                              <a:rPr lang="ru-RU" sz="2200" i="1">
-                                <a:latin typeface="Cambria Math" panose="02040503050406030204" pitchFamily="18" charset="0"/>
-                                <a:ea typeface="Cambria Math" panose="02040503050406030204" pitchFamily="18" charset="0"/>
-                                <a:cs typeface="Times New Roman" panose="02020603050405020304" pitchFamily="18" charset="0"/>
-                              </a:rPr>
-                              <m:t>𝜇</m:t>
-                            </m:r>
-                          </m:e>
-                          <m:sub>
-                            <m:r>
-                              <a:rPr lang="en-US" sz="2200" i="1">
-                                <a:latin typeface="Cambria Math" panose="02040503050406030204" pitchFamily="18" charset="0"/>
-                                <a:ea typeface="Cambria Math" panose="02040503050406030204" pitchFamily="18" charset="0"/>
-                                <a:cs typeface="Times New Roman" panose="02020603050405020304" pitchFamily="18" charset="0"/>
-                              </a:rPr>
-                              <m:t>𝑝</m:t>
-                            </m:r>
-                          </m:sub>
-                          <m:sup>
-                            <m:r>
-                              <a:rPr lang="en-US" sz="2200" i="1">
-                                <a:latin typeface="Cambria Math" panose="02040503050406030204" pitchFamily="18" charset="0"/>
-                                <a:ea typeface="Cambria Math" panose="02040503050406030204" pitchFamily="18" charset="0"/>
-                                <a:cs typeface="Times New Roman" panose="02020603050405020304" pitchFamily="18" charset="0"/>
-                              </a:rPr>
-                              <m:t>𝑠</m:t>
-                            </m:r>
-                            <m:r>
-                              <a:rPr lang="en-US" sz="2200" i="1">
-                                <a:latin typeface="Cambria Math" panose="02040503050406030204" pitchFamily="18" charset="0"/>
-                                <a:ea typeface="Cambria Math" panose="02040503050406030204" pitchFamily="18" charset="0"/>
-                                <a:cs typeface="Times New Roman" panose="02020603050405020304" pitchFamily="18" charset="0"/>
-                              </a:rPr>
-                              <m:t>′</m:t>
-                            </m:r>
-                          </m:sup>
-                        </m:sSubSup>
-                        <m:r>
-                          <a:rPr lang="ru-RU" sz="2200" i="1">
-                            <a:latin typeface="Cambria Math" panose="02040503050406030204" pitchFamily="18" charset="0"/>
-                            <a:ea typeface="Cambria Math" panose="02040503050406030204" pitchFamily="18" charset="0"/>
-                            <a:cs typeface="Times New Roman" panose="02020603050405020304" pitchFamily="18" charset="0"/>
-                          </a:rPr>
-                          <m:t>∗</m:t>
-                        </m:r>
-                        <m:r>
-                          <a:rPr lang="en-US" sz="2200" i="1">
-                            <a:latin typeface="Cambria Math" panose="02040503050406030204" pitchFamily="18" charset="0"/>
-                            <a:ea typeface="Cambria Math" panose="02040503050406030204" pitchFamily="18" charset="0"/>
-                            <a:cs typeface="Times New Roman" panose="02020603050405020304" pitchFamily="18" charset="0"/>
-                          </a:rPr>
-                          <m:t>𝑞</m:t>
-                        </m:r>
-                      </m:num>
-                      <m:den>
-                        <m:r>
-                          <a:rPr lang="en-US" sz="2200" i="1">
-                            <a:latin typeface="Cambria Math" panose="02040503050406030204" pitchFamily="18" charset="0"/>
-                            <a:ea typeface="Cambria Math" panose="02040503050406030204" pitchFamily="18" charset="0"/>
-                            <a:cs typeface="Times New Roman" panose="02020603050405020304" pitchFamily="18" charset="0"/>
-                          </a:rPr>
-                          <m:t>𝑙</m:t>
-                        </m:r>
-                      </m:den>
-                    </m:f>
-                    <m:r>
-                      <a:rPr lang="en-US" sz="2200" i="1">
-                        <a:latin typeface="Cambria Math" panose="02040503050406030204" pitchFamily="18" charset="0"/>
-                        <a:ea typeface="Cambria Math" panose="02040503050406030204" pitchFamily="18" charset="0"/>
-                        <a:cs typeface="Times New Roman" panose="02020603050405020304" pitchFamily="18" charset="0"/>
-                      </a:rPr>
-                      <m:t>,0≤</m:t>
-                    </m:r>
-                    <m:sSubSup>
-                      <m:sSubSupPr>
-                        <m:ctrlPr>
-                          <a:rPr lang="ru-RU" sz="2200" i="1">
-                            <a:latin typeface="Cambria Math" panose="02040503050406030204" pitchFamily="18" charset="0"/>
-                            <a:ea typeface="Cambria Math" panose="02040503050406030204" pitchFamily="18" charset="0"/>
-                            <a:cs typeface="Times New Roman" panose="02020603050405020304" pitchFamily="18" charset="0"/>
-                          </a:rPr>
-                        </m:ctrlPr>
-                      </m:sSubSupPr>
-                      <m:e>
-                        <m:r>
-                          <a:rPr lang="ru-RU" sz="2200" i="1">
-                            <a:latin typeface="Cambria Math" panose="02040503050406030204" pitchFamily="18" charset="0"/>
-                            <a:ea typeface="Cambria Math" panose="02040503050406030204" pitchFamily="18" charset="0"/>
-                            <a:cs typeface="Times New Roman" panose="02020603050405020304" pitchFamily="18" charset="0"/>
-                          </a:rPr>
-                          <m:t>𝜆</m:t>
-                        </m:r>
-                      </m:e>
-                      <m:sub>
-                        <m:r>
-                          <a:rPr lang="en-US" sz="2200" i="1">
-                            <a:latin typeface="Cambria Math" panose="02040503050406030204" pitchFamily="18" charset="0"/>
-                            <a:ea typeface="Cambria Math" panose="02040503050406030204" pitchFamily="18" charset="0"/>
-                            <a:cs typeface="Times New Roman" panose="02020603050405020304" pitchFamily="18" charset="0"/>
-                          </a:rPr>
-                          <m:t>𝑝</m:t>
-                        </m:r>
-                      </m:sub>
-                      <m:sup>
-                        <m:sSup>
-                          <m:sSupPr>
-                            <m:ctrlPr>
-                              <a:rPr lang="en-US" sz="2200" i="1">
-                                <a:latin typeface="Cambria Math" panose="02040503050406030204" pitchFamily="18" charset="0"/>
-                                <a:ea typeface="Cambria Math" panose="02040503050406030204" pitchFamily="18" charset="0"/>
-                                <a:cs typeface="Times New Roman" panose="02020603050405020304" pitchFamily="18" charset="0"/>
-                              </a:rPr>
-                            </m:ctrlPr>
-                          </m:sSupPr>
-                          <m:e>
-                            <m:r>
-                              <a:rPr lang="en-US" sz="2200" i="1">
-                                <a:latin typeface="Cambria Math" panose="02040503050406030204" pitchFamily="18" charset="0"/>
-                                <a:ea typeface="Cambria Math" panose="02040503050406030204" pitchFamily="18" charset="0"/>
-                                <a:cs typeface="Times New Roman" panose="02020603050405020304" pitchFamily="18" charset="0"/>
-                              </a:rPr>
-                              <m:t>𝑠</m:t>
-                            </m:r>
-                          </m:e>
-                          <m:sup>
-                            <m:r>
-                              <a:rPr lang="en-US" sz="2200" i="1">
-                                <a:latin typeface="Cambria Math" panose="02040503050406030204" pitchFamily="18" charset="0"/>
-                                <a:ea typeface="Cambria Math" panose="02040503050406030204" pitchFamily="18" charset="0"/>
-                                <a:cs typeface="Times New Roman" panose="02020603050405020304" pitchFamily="18" charset="0"/>
-                              </a:rPr>
-                              <m:t>′</m:t>
-                            </m:r>
-                          </m:sup>
-                        </m:sSup>
-                      </m:sup>
-                    </m:sSubSup>
-                    <m:r>
-                      <a:rPr lang="en-US" sz="2200" i="1">
-                        <a:latin typeface="Cambria Math" panose="02040503050406030204" pitchFamily="18" charset="0"/>
-                        <a:ea typeface="Cambria Math" panose="02040503050406030204" pitchFamily="18" charset="0"/>
-                        <a:cs typeface="Times New Roman" panose="02020603050405020304" pitchFamily="18" charset="0"/>
-                      </a:rPr>
-                      <m:t>, </m:t>
-                    </m:r>
-                  </m:oMath>
-                </a14:m>
-                <a:r>
-                  <a:rPr lang="ru-RU" sz="2200" dirty="0">
-                    <a:latin typeface="Times New Roman" panose="02020603050405020304" pitchFamily="18" charset="0"/>
-                    <a:cs typeface="Times New Roman" panose="02020603050405020304" pitchFamily="18" charset="0"/>
-                  </a:rPr>
-                  <a:t>где</a:t>
-                </a:r>
-                <a:r>
-                  <a:rPr lang="en-US" sz="2200" dirty="0">
-                    <a:latin typeface="Times New Roman" panose="02020603050405020304" pitchFamily="18" charset="0"/>
-                    <a:cs typeface="Times New Roman" panose="02020603050405020304" pitchFamily="18" charset="0"/>
-                  </a:rPr>
-                  <a:t> </a:t>
-                </a:r>
-                <a14:m>
-                  <m:oMath xmlns:m="http://schemas.openxmlformats.org/officeDocument/2006/math">
-                    <m:sSubSup>
-                      <m:sSubSupPr>
-                        <m:ctrlPr>
-                          <a:rPr lang="ru-RU" sz="2200" i="1">
-                            <a:latin typeface="Cambria Math" panose="02040503050406030204" pitchFamily="18" charset="0"/>
-                            <a:ea typeface="Cambria Math" panose="02040503050406030204" pitchFamily="18" charset="0"/>
-                            <a:cs typeface="Times New Roman" panose="02020603050405020304" pitchFamily="18" charset="0"/>
-                          </a:rPr>
-                        </m:ctrlPr>
-                      </m:sSubSupPr>
-                      <m:e>
-                        <m:r>
-                          <a:rPr lang="ru-RU" sz="2200" i="1">
-                            <a:latin typeface="Cambria Math" panose="02040503050406030204" pitchFamily="18" charset="0"/>
-                            <a:ea typeface="Cambria Math" panose="02040503050406030204" pitchFamily="18" charset="0"/>
-                            <a:cs typeface="Times New Roman" panose="02020603050405020304" pitchFamily="18" charset="0"/>
-                          </a:rPr>
-                          <m:t>𝜆</m:t>
-                        </m:r>
-                      </m:e>
-                      <m:sub>
-                        <m:r>
-                          <a:rPr lang="en-US" sz="2200" i="1">
-                            <a:latin typeface="Cambria Math" panose="02040503050406030204" pitchFamily="18" charset="0"/>
-                            <a:ea typeface="Cambria Math" panose="02040503050406030204" pitchFamily="18" charset="0"/>
-                            <a:cs typeface="Times New Roman" panose="02020603050405020304" pitchFamily="18" charset="0"/>
-                          </a:rPr>
-                          <m:t>𝑝</m:t>
-                        </m:r>
-                      </m:sub>
-                      <m:sup>
-                        <m:r>
-                          <a:rPr lang="en-US" sz="2200" i="1">
-                            <a:latin typeface="Cambria Math" panose="02040503050406030204" pitchFamily="18" charset="0"/>
-                            <a:ea typeface="Cambria Math" panose="02040503050406030204" pitchFamily="18" charset="0"/>
-                            <a:cs typeface="Times New Roman" panose="02020603050405020304" pitchFamily="18" charset="0"/>
-                          </a:rPr>
-                          <m:t>𝑠</m:t>
-                        </m:r>
-                        <m:r>
-                          <a:rPr lang="en-US" sz="2200" i="1">
-                            <a:latin typeface="Cambria Math" panose="02040503050406030204" pitchFamily="18" charset="0"/>
-                            <a:ea typeface="Cambria Math" panose="02040503050406030204" pitchFamily="18" charset="0"/>
-                            <a:cs typeface="Times New Roman" panose="02020603050405020304" pitchFamily="18" charset="0"/>
-                          </a:rPr>
-                          <m:t>′</m:t>
-                        </m:r>
-                      </m:sup>
-                    </m:sSubSup>
-                  </m:oMath>
-                </a14:m>
-                <a:r>
-                  <a:rPr lang="ru-RU" sz="2200" dirty="0">
-                    <a:latin typeface="Times New Roman" panose="02020603050405020304" pitchFamily="18" charset="0"/>
-                    <a:cs typeface="Times New Roman" panose="02020603050405020304" pitchFamily="18" charset="0"/>
-                  </a:rPr>
-                  <a:t> – количество</a:t>
-                </a:r>
-                <a:r>
-                  <a:rPr lang="en-US" sz="2200" dirty="0">
-                    <a:latin typeface="Times New Roman" panose="02020603050405020304" pitchFamily="18" charset="0"/>
-                    <a:cs typeface="Times New Roman" panose="02020603050405020304" pitchFamily="18" charset="0"/>
-                  </a:rPr>
-                  <a:t> </a:t>
-                </a:r>
-                <a:r>
-                  <a:rPr lang="ru-RU" sz="2200" dirty="0">
-                    <a:latin typeface="Times New Roman" panose="02020603050405020304" pitchFamily="18" charset="0"/>
-                    <a:cs typeface="Times New Roman" panose="02020603050405020304" pitchFamily="18" charset="0"/>
-                  </a:rPr>
-                  <a:t>вхождений шаблона </a:t>
-                </a:r>
-                <a14:m>
-                  <m:oMath xmlns:m="http://schemas.openxmlformats.org/officeDocument/2006/math">
-                    <m:r>
-                      <a:rPr lang="en-US" sz="2200" i="1">
-                        <a:latin typeface="Cambria Math" panose="02040503050406030204" pitchFamily="18" charset="0"/>
-                        <a:ea typeface="Cambria Math" panose="02040503050406030204" pitchFamily="18" charset="0"/>
-                        <a:cs typeface="Times New Roman" panose="02020603050405020304" pitchFamily="18" charset="0"/>
-                      </a:rPr>
-                      <m:t>𝑝</m:t>
-                    </m:r>
-                  </m:oMath>
-                </a14:m>
-                <a:r>
-                  <a:rPr lang="ru-RU" sz="2200" dirty="0">
-                    <a:latin typeface="Times New Roman" panose="02020603050405020304" pitchFamily="18" charset="0"/>
-                    <a:cs typeface="Times New Roman" panose="02020603050405020304" pitchFamily="18" charset="0"/>
-                  </a:rPr>
-                  <a:t> в сессию </a:t>
-                </a:r>
-                <a14:m>
-                  <m:oMath xmlns:m="http://schemas.openxmlformats.org/officeDocument/2006/math">
-                    <m:r>
-                      <a:rPr lang="en-US" sz="2200" i="1">
-                        <a:latin typeface="Cambria Math" panose="02040503050406030204" pitchFamily="18" charset="0"/>
-                        <a:ea typeface="Cambria Math" panose="02040503050406030204" pitchFamily="18" charset="0"/>
-                        <a:cs typeface="Times New Roman" panose="02020603050405020304" pitchFamily="18" charset="0"/>
-                      </a:rPr>
-                      <m:t>𝑠</m:t>
-                    </m:r>
-                    <m:r>
-                      <a:rPr lang="en-US" sz="2200" i="1">
-                        <a:latin typeface="Cambria Math" panose="02040503050406030204" pitchFamily="18" charset="0"/>
-                        <a:ea typeface="Cambria Math" panose="02040503050406030204" pitchFamily="18" charset="0"/>
-                        <a:cs typeface="Times New Roman" panose="02020603050405020304" pitchFamily="18" charset="0"/>
-                      </a:rPr>
-                      <m:t>′</m:t>
-                    </m:r>
-                  </m:oMath>
-                </a14:m>
-                <a:r>
-                  <a:rPr lang="ru-RU" sz="2200" dirty="0">
-                    <a:latin typeface="Times New Roman" panose="02020603050405020304" pitchFamily="18" charset="0"/>
-                    <a:cs typeface="Times New Roman" panose="02020603050405020304" pitchFamily="18" charset="0"/>
-                  </a:rPr>
-                  <a:t>; </a:t>
-                </a:r>
-                <a14:m>
-                  <m:oMath xmlns:m="http://schemas.openxmlformats.org/officeDocument/2006/math">
-                    <m:r>
-                      <a:rPr lang="en-US" sz="2200" i="1">
-                        <a:latin typeface="Cambria Math" panose="02040503050406030204" pitchFamily="18" charset="0"/>
-                        <a:ea typeface="Cambria Math" panose="02040503050406030204" pitchFamily="18" charset="0"/>
-                        <a:cs typeface="Times New Roman" panose="02020603050405020304" pitchFamily="18" charset="0"/>
-                      </a:rPr>
-                      <m:t>𝑞</m:t>
-                    </m:r>
-                  </m:oMath>
-                </a14:m>
-                <a:r>
-                  <a:rPr lang="ru-RU" sz="2200" dirty="0">
-                    <a:latin typeface="Times New Roman" panose="02020603050405020304" pitchFamily="18" charset="0"/>
-                    <a:cs typeface="Times New Roman" panose="02020603050405020304" pitchFamily="18" charset="0"/>
-                  </a:rPr>
-                  <a:t> – длина шаблона </a:t>
-                </a:r>
-                <a14:m>
-                  <m:oMath xmlns:m="http://schemas.openxmlformats.org/officeDocument/2006/math">
-                    <m:r>
-                      <a:rPr lang="en-US" sz="2200" i="1">
-                        <a:latin typeface="Cambria Math" panose="02040503050406030204" pitchFamily="18" charset="0"/>
-                        <a:ea typeface="Cambria Math" panose="02040503050406030204" pitchFamily="18" charset="0"/>
-                        <a:cs typeface="Times New Roman" panose="02020603050405020304" pitchFamily="18" charset="0"/>
-                      </a:rPr>
-                      <m:t>𝑝</m:t>
-                    </m:r>
-                  </m:oMath>
-                </a14:m>
-                <a:r>
-                  <a:rPr lang="ru-RU" sz="2200" dirty="0">
-                    <a:latin typeface="Times New Roman" panose="02020603050405020304" pitchFamily="18" charset="0"/>
-                    <a:cs typeface="Times New Roman" panose="02020603050405020304" pitchFamily="18" charset="0"/>
-                  </a:rPr>
-                  <a:t>; </a:t>
-                </a:r>
-                <a14:m>
-                  <m:oMath xmlns:m="http://schemas.openxmlformats.org/officeDocument/2006/math">
-                    <m:r>
-                      <a:rPr lang="en-US" sz="2200" i="1">
-                        <a:latin typeface="Cambria Math" panose="02040503050406030204" pitchFamily="18" charset="0"/>
-                        <a:ea typeface="Cambria Math" panose="02040503050406030204" pitchFamily="18" charset="0"/>
-                        <a:cs typeface="Times New Roman" panose="02020603050405020304" pitchFamily="18" charset="0"/>
-                      </a:rPr>
-                      <m:t>𝑙</m:t>
-                    </m:r>
-                  </m:oMath>
-                </a14:m>
-                <a:r>
-                  <a:rPr lang="ru-RU" sz="2200" dirty="0">
-                    <a:latin typeface="Times New Roman" panose="02020603050405020304" pitchFamily="18" charset="0"/>
-                    <a:cs typeface="Times New Roman" panose="02020603050405020304" pitchFamily="18" charset="0"/>
-                  </a:rPr>
-                  <a:t> – длина сессии </a:t>
-                </a:r>
-                <a14:m>
-                  <m:oMath xmlns:m="http://schemas.openxmlformats.org/officeDocument/2006/math">
-                    <m:sSup>
-                      <m:sSupPr>
-                        <m:ctrlPr>
-                          <a:rPr lang="en-US" sz="2200" i="1">
-                            <a:latin typeface="Cambria Math" panose="02040503050406030204" pitchFamily="18" charset="0"/>
-                            <a:ea typeface="Cambria Math" panose="02040503050406030204" pitchFamily="18" charset="0"/>
-                            <a:cs typeface="Times New Roman" panose="02020603050405020304" pitchFamily="18" charset="0"/>
-                          </a:rPr>
-                        </m:ctrlPr>
-                      </m:sSupPr>
-                      <m:e>
-                        <m:r>
-                          <a:rPr lang="en-US" sz="2200" i="1">
-                            <a:latin typeface="Cambria Math" panose="02040503050406030204" pitchFamily="18" charset="0"/>
-                            <a:ea typeface="Cambria Math" panose="02040503050406030204" pitchFamily="18" charset="0"/>
-                            <a:cs typeface="Times New Roman" panose="02020603050405020304" pitchFamily="18" charset="0"/>
-                          </a:rPr>
-                          <m:t>𝑠</m:t>
-                        </m:r>
-                      </m:e>
-                      <m:sup>
-                        <m:r>
-                          <a:rPr lang="en-US" sz="2200" i="1">
-                            <a:latin typeface="Cambria Math" panose="02040503050406030204" pitchFamily="18" charset="0"/>
-                            <a:ea typeface="Cambria Math" panose="02040503050406030204" pitchFamily="18" charset="0"/>
-                            <a:cs typeface="Times New Roman" panose="02020603050405020304" pitchFamily="18" charset="0"/>
-                          </a:rPr>
-                          <m:t>′</m:t>
-                        </m:r>
-                      </m:sup>
-                    </m:sSup>
-                  </m:oMath>
-                </a14:m>
-                <a:r>
-                  <a:rPr lang="en-US" sz="2200" dirty="0">
-                    <a:latin typeface="Times New Roman" panose="02020603050405020304" pitchFamily="18" charset="0"/>
-                    <a:ea typeface="Times New Roman" panose="02020603050405020304" pitchFamily="18" charset="0"/>
-                    <a:cs typeface="Times New Roman" panose="02020603050405020304" pitchFamily="18" charset="0"/>
-                  </a:rPr>
-                  <a:t>.</a:t>
-                </a:r>
-                <a:endParaRPr lang="ru-RU" sz="2200" dirty="0">
-                  <a:latin typeface="Times New Roman" panose="02020603050405020304" pitchFamily="18" charset="0"/>
-                  <a:ea typeface="Times New Roman" panose="02020603050405020304" pitchFamily="18" charset="0"/>
-                  <a:cs typeface="Times New Roman" panose="02020603050405020304" pitchFamily="18" charset="0"/>
-                </a:endParaRPr>
-              </a:p>
-              <a:p>
-                <a:pPr indent="0">
-                  <a:lnSpc>
-                    <a:spcPct val="100000"/>
-                  </a:lnSpc>
-                  <a:buNone/>
-                </a:pPr>
-                <a:r>
-                  <a:rPr lang="ru-RU" sz="2200" dirty="0">
-                    <a:latin typeface="Times New Roman" panose="02020603050405020304" pitchFamily="18" charset="0"/>
-                    <a:ea typeface="Times New Roman" panose="02020603050405020304" pitchFamily="18" charset="0"/>
-                    <a:cs typeface="Times New Roman" panose="02020603050405020304" pitchFamily="18" charset="0"/>
-                  </a:rPr>
-                  <a:t>Например, пусть имеется сессия </a:t>
-                </a:r>
-                <a:r>
-                  <a:rPr lang="ru-RU" sz="2200" b="0" i="0" u="none" strike="noStrike" baseline="0" dirty="0">
-                    <a:latin typeface="Times New Roman" panose="02020603050405020304" pitchFamily="18" charset="0"/>
-                    <a:cs typeface="Times New Roman" panose="02020603050405020304" pitchFamily="18" charset="0"/>
-                  </a:rPr>
-                  <a:t>⟨2, 1, 2, 1, 3, 2, 1, 2, 1, 3⟩.</a:t>
-                </a:r>
-                <a:br>
-                  <a:rPr lang="en-US" sz="2200" b="0" i="0" u="none" strike="noStrike" baseline="0" dirty="0">
-                    <a:latin typeface="Times New Roman" panose="02020603050405020304" pitchFamily="18" charset="0"/>
-                    <a:cs typeface="Times New Roman" panose="02020603050405020304" pitchFamily="18" charset="0"/>
-                  </a:rPr>
-                </a:br>
-                <a:r>
-                  <a:rPr lang="ru-RU" sz="2200" dirty="0">
-                    <a:latin typeface="Times New Roman" panose="02020603050405020304" pitchFamily="18" charset="0"/>
-                    <a:cs typeface="Times New Roman" panose="02020603050405020304" pitchFamily="18" charset="0"/>
-                  </a:rPr>
-                  <a:t>Рассчитаем кол-во вхождений (</a:t>
-                </a:r>
-                <a:r>
-                  <a:rPr lang="el-GR" sz="2200" dirty="0">
-                    <a:latin typeface="Times New Roman" panose="02020603050405020304" pitchFamily="18" charset="0"/>
-                    <a:cs typeface="Times New Roman" panose="02020603050405020304" pitchFamily="18" charset="0"/>
-                  </a:rPr>
-                  <a:t>μ</a:t>
-                </a:r>
-                <a:r>
-                  <a:rPr lang="ru-RU" sz="2200" dirty="0">
-                    <a:latin typeface="Times New Roman" panose="02020603050405020304" pitchFamily="18" charset="0"/>
-                    <a:cs typeface="Times New Roman" panose="02020603050405020304" pitchFamily="18" charset="0"/>
-                  </a:rPr>
-                  <a:t>) и поддержку (</a:t>
-                </a:r>
-                <a:r>
-                  <a:rPr lang="el-GR" sz="2200" dirty="0">
-                    <a:latin typeface="Times New Roman" panose="02020603050405020304" pitchFamily="18" charset="0"/>
-                    <a:cs typeface="Times New Roman" panose="02020603050405020304" pitchFamily="18" charset="0"/>
-                  </a:rPr>
-                  <a:t>λ</a:t>
-                </a:r>
-                <a:r>
-                  <a:rPr lang="ru-RU" sz="2200" dirty="0">
-                    <a:latin typeface="Times New Roman" panose="02020603050405020304" pitchFamily="18" charset="0"/>
-                    <a:cs typeface="Times New Roman" panose="02020603050405020304" pitchFamily="18" charset="0"/>
-                  </a:rPr>
-                  <a:t>) для следующих шаблонов:</a:t>
-                </a:r>
-              </a:p>
-              <a:p>
-                <a:pPr indent="0">
-                  <a:lnSpc>
-                    <a:spcPct val="100000"/>
-                  </a:lnSpc>
-                  <a:buNone/>
-                </a:pPr>
-                <a:r>
-                  <a:rPr lang="en-US" sz="2200" dirty="0">
-                    <a:latin typeface="Times New Roman" panose="02020603050405020304" pitchFamily="18" charset="0"/>
-                    <a:cs typeface="Times New Roman" panose="02020603050405020304" pitchFamily="18" charset="0"/>
-                  </a:rPr>
-                  <a:t>p1 = 〈2, 1〉, </a:t>
-                </a:r>
-                <a:r>
-                  <a:rPr lang="el-GR" sz="2200" dirty="0">
-                    <a:latin typeface="Times New Roman" panose="02020603050405020304" pitchFamily="18" charset="0"/>
-                    <a:cs typeface="Times New Roman" panose="02020603050405020304" pitchFamily="18" charset="0"/>
-                  </a:rPr>
-                  <a:t>μ</a:t>
-                </a:r>
-                <a:r>
-                  <a:rPr lang="en-US" sz="2200" dirty="0">
-                    <a:latin typeface="Times New Roman" panose="02020603050405020304" pitchFamily="18" charset="0"/>
-                    <a:cs typeface="Times New Roman" panose="02020603050405020304" pitchFamily="18" charset="0"/>
-                  </a:rPr>
-                  <a:t> = 4, </a:t>
-                </a:r>
-                <a:r>
-                  <a:rPr lang="el-GR" sz="2200" dirty="0">
-                    <a:latin typeface="Times New Roman" panose="02020603050405020304" pitchFamily="18" charset="0"/>
-                    <a:cs typeface="Times New Roman" panose="02020603050405020304" pitchFamily="18" charset="0"/>
-                  </a:rPr>
-                  <a:t>λ</a:t>
-                </a:r>
-                <a:r>
-                  <a:rPr lang="en-US" sz="2200" dirty="0">
-                    <a:latin typeface="Times New Roman" panose="02020603050405020304" pitchFamily="18" charset="0"/>
-                    <a:cs typeface="Times New Roman" panose="02020603050405020304" pitchFamily="18" charset="0"/>
-                  </a:rPr>
-                  <a:t> = 0.8;</a:t>
-                </a:r>
-                <a:br>
-                  <a:rPr lang="ru-RU" sz="2200" dirty="0">
-                    <a:latin typeface="Times New Roman" panose="02020603050405020304" pitchFamily="18" charset="0"/>
-                    <a:cs typeface="Times New Roman" panose="02020603050405020304" pitchFamily="18" charset="0"/>
-                  </a:rPr>
-                </a:br>
-                <a:r>
-                  <a:rPr lang="en-US" sz="2200" dirty="0">
-                    <a:latin typeface="Times New Roman" panose="02020603050405020304" pitchFamily="18" charset="0"/>
-                    <a:cs typeface="Times New Roman" panose="02020603050405020304" pitchFamily="18" charset="0"/>
-                  </a:rPr>
-                  <a:t>p2 = 〈2, 1, 2, 1〉, </a:t>
-                </a:r>
-                <a:r>
-                  <a:rPr lang="el-GR" sz="2200" dirty="0">
-                    <a:latin typeface="Times New Roman" panose="02020603050405020304" pitchFamily="18" charset="0"/>
-                    <a:cs typeface="Times New Roman" panose="02020603050405020304" pitchFamily="18" charset="0"/>
-                  </a:rPr>
-                  <a:t>μ</a:t>
-                </a:r>
-                <a:r>
-                  <a:rPr lang="en-US" sz="2200" dirty="0">
-                    <a:latin typeface="Times New Roman" panose="02020603050405020304" pitchFamily="18" charset="0"/>
-                    <a:cs typeface="Times New Roman" panose="02020603050405020304" pitchFamily="18" charset="0"/>
-                  </a:rPr>
-                  <a:t> = 2, </a:t>
-                </a:r>
-                <a:r>
-                  <a:rPr lang="el-GR" sz="2200" dirty="0">
-                    <a:latin typeface="Times New Roman" panose="02020603050405020304" pitchFamily="18" charset="0"/>
-                    <a:cs typeface="Times New Roman" panose="02020603050405020304" pitchFamily="18" charset="0"/>
-                  </a:rPr>
-                  <a:t>λ</a:t>
-                </a:r>
-                <a:r>
-                  <a:rPr lang="en-US" sz="2200" dirty="0">
-                    <a:latin typeface="Times New Roman" panose="02020603050405020304" pitchFamily="18" charset="0"/>
-                    <a:cs typeface="Times New Roman" panose="02020603050405020304" pitchFamily="18" charset="0"/>
-                  </a:rPr>
-                  <a:t> = 0.8;</a:t>
-                </a:r>
-                <a:br>
-                  <a:rPr lang="ru-RU" sz="2200" dirty="0">
-                    <a:latin typeface="Times New Roman" panose="02020603050405020304" pitchFamily="18" charset="0"/>
-                    <a:cs typeface="Times New Roman" panose="02020603050405020304" pitchFamily="18" charset="0"/>
-                  </a:rPr>
-                </a:br>
-                <a:r>
-                  <a:rPr lang="en-US" sz="2200" dirty="0">
-                    <a:latin typeface="Times New Roman" panose="02020603050405020304" pitchFamily="18" charset="0"/>
-                    <a:cs typeface="Times New Roman" panose="02020603050405020304" pitchFamily="18" charset="0"/>
-                  </a:rPr>
-                  <a:t>p3 = 〈2, 1, 2, 1, 3〉, </a:t>
-                </a:r>
-                <a:r>
-                  <a:rPr lang="el-GR" sz="2200" dirty="0">
-                    <a:latin typeface="Times New Roman" panose="02020603050405020304" pitchFamily="18" charset="0"/>
-                    <a:cs typeface="Times New Roman" panose="02020603050405020304" pitchFamily="18" charset="0"/>
-                  </a:rPr>
-                  <a:t>μ</a:t>
-                </a:r>
-                <a:r>
-                  <a:rPr lang="en-US" sz="2200" dirty="0">
-                    <a:latin typeface="Times New Roman" panose="02020603050405020304" pitchFamily="18" charset="0"/>
-                    <a:cs typeface="Times New Roman" panose="02020603050405020304" pitchFamily="18" charset="0"/>
-                  </a:rPr>
-                  <a:t> = 2, </a:t>
-                </a:r>
-                <a:r>
-                  <a:rPr lang="el-GR" sz="2200" dirty="0">
-                    <a:latin typeface="Times New Roman" panose="02020603050405020304" pitchFamily="18" charset="0"/>
-                    <a:cs typeface="Times New Roman" panose="02020603050405020304" pitchFamily="18" charset="0"/>
-                  </a:rPr>
-                  <a:t>λ</a:t>
-                </a:r>
-                <a:r>
-                  <a:rPr lang="en-US" sz="2200" dirty="0">
-                    <a:latin typeface="Times New Roman" panose="02020603050405020304" pitchFamily="18" charset="0"/>
-                    <a:cs typeface="Times New Roman" panose="02020603050405020304" pitchFamily="18" charset="0"/>
-                  </a:rPr>
-                  <a:t> = 1;</a:t>
-                </a:r>
-                <a:br>
-                  <a:rPr lang="ru-RU" sz="2200" dirty="0">
-                    <a:latin typeface="Times New Roman" panose="02020603050405020304" pitchFamily="18" charset="0"/>
-                    <a:cs typeface="Times New Roman" panose="02020603050405020304" pitchFamily="18" charset="0"/>
-                  </a:rPr>
-                </a:br>
-                <a:r>
-                  <a:rPr lang="en-US" sz="2200" dirty="0">
-                    <a:latin typeface="Times New Roman" panose="02020603050405020304" pitchFamily="18" charset="0"/>
-                    <a:cs typeface="Times New Roman" panose="02020603050405020304" pitchFamily="18" charset="0"/>
-                  </a:rPr>
-                  <a:t>p4 = 〈3, 2, 1, 2, 1〉, </a:t>
-                </a:r>
-                <a:r>
-                  <a:rPr lang="el-GR" sz="2200" dirty="0">
-                    <a:latin typeface="Times New Roman" panose="02020603050405020304" pitchFamily="18" charset="0"/>
-                    <a:cs typeface="Times New Roman" panose="02020603050405020304" pitchFamily="18" charset="0"/>
-                  </a:rPr>
-                  <a:t>μ</a:t>
-                </a:r>
-                <a:r>
-                  <a:rPr lang="en-US" sz="2200" dirty="0">
-                    <a:latin typeface="Times New Roman" panose="02020603050405020304" pitchFamily="18" charset="0"/>
-                    <a:cs typeface="Times New Roman" panose="02020603050405020304" pitchFamily="18" charset="0"/>
-                  </a:rPr>
-                  <a:t> = 1, </a:t>
-                </a:r>
-                <a:r>
-                  <a:rPr lang="el-GR" sz="2200" dirty="0">
-                    <a:latin typeface="Times New Roman" panose="02020603050405020304" pitchFamily="18" charset="0"/>
-                    <a:cs typeface="Times New Roman" panose="02020603050405020304" pitchFamily="18" charset="0"/>
-                  </a:rPr>
-                  <a:t>λ</a:t>
-                </a:r>
-                <a:r>
-                  <a:rPr lang="en-US" sz="2200" dirty="0">
-                    <a:latin typeface="Times New Roman" panose="02020603050405020304" pitchFamily="18" charset="0"/>
-                    <a:cs typeface="Times New Roman" panose="02020603050405020304" pitchFamily="18" charset="0"/>
-                  </a:rPr>
-                  <a:t> = 0.5.</a:t>
-                </a:r>
-                <a:endParaRPr lang="ru-RU" sz="2200" b="0" i="1" dirty="0">
-                  <a:latin typeface="Cambria Math" panose="02040503050406030204" pitchFamily="18" charset="0"/>
-                  <a:ea typeface="Cambria Math" panose="02040503050406030204" pitchFamily="18" charset="0"/>
-                  <a:cs typeface="Times New Roman" panose="02020603050405020304" pitchFamily="18" charset="0"/>
-                </a:endParaRPr>
-              </a:p>
-            </p:txBody>
-          </p:sp>
-        </mc:Choice>
-        <mc:Fallback xmlns="">
-          <p:sp>
-            <p:nvSpPr>
-              <p:cNvPr id="3" name="Объект 2">
-                <a:extLst>
-                  <a:ext uri="{FF2B5EF4-FFF2-40B4-BE49-F238E27FC236}">
-                    <a16:creationId xmlns:a16="http://schemas.microsoft.com/office/drawing/2014/main" id="{68541323-2632-074C-E69F-FC80AB230174}"/>
-                  </a:ext>
-                </a:extLst>
-              </p:cNvPr>
-              <p:cNvSpPr>
-                <a:spLocks noGrp="1" noRot="1" noChangeAspect="1" noMove="1" noResize="1" noEditPoints="1" noAdjustHandles="1" noChangeArrowheads="1" noChangeShapeType="1" noTextEdit="1"/>
-              </p:cNvSpPr>
-              <p:nvPr>
-                <p:ph idx="1"/>
-              </p:nvPr>
-            </p:nvSpPr>
-            <p:spPr>
-              <a:xfrm>
-                <a:off x="428017" y="1253331"/>
-                <a:ext cx="11182378" cy="5168894"/>
-              </a:xfrm>
-              <a:blipFill>
-                <a:blip r:embed="rId2"/>
-                <a:stretch>
-                  <a:fillRect t="-825"/>
-                </a:stretch>
-              </a:blipFill>
-            </p:spPr>
-            <p:txBody>
-              <a:bodyPr/>
-              <a:lstStyle/>
-              <a:p>
-                <a:r>
-                  <a:rPr lang="ru-RU">
-                    <a:noFill/>
-                  </a:rPr>
-                  <a:t> </a:t>
-                </a:r>
-              </a:p>
-            </p:txBody>
-          </p:sp>
-        </mc:Fallback>
-      </mc:AlternateContent>
-      <p:sp>
-        <p:nvSpPr>
-          <p:cNvPr id="4" name="Номер слайда 3">
-            <a:extLst>
-              <a:ext uri="{FF2B5EF4-FFF2-40B4-BE49-F238E27FC236}">
-                <a16:creationId xmlns:a16="http://schemas.microsoft.com/office/drawing/2014/main" id="{80FEEFAF-0D6B-464C-7360-370FF23083CC}"/>
-              </a:ext>
-            </a:extLst>
-          </p:cNvPr>
-          <p:cNvSpPr>
-            <a:spLocks noGrp="1"/>
-          </p:cNvSpPr>
-          <p:nvPr>
-            <p:ph type="sldNum" sz="quarter" idx="12"/>
-          </p:nvPr>
-        </p:nvSpPr>
-        <p:spPr/>
-        <p:txBody>
-          <a:bodyPr/>
-          <a:lstStyle/>
-          <a:p>
-            <a:fld id="{E83D2FD5-BBDA-43D0-B172-791327EA2B6A}" type="slidenum">
-              <a:rPr lang="ru-RU" smtClean="0"/>
-              <a:t>5</a:t>
-            </a:fld>
-            <a:endParaRPr lang="ru-RU" dirty="0"/>
-          </a:p>
-        </p:txBody>
-      </p:sp>
-    </p:spTree>
-    <p:extLst>
-      <p:ext uri="{BB962C8B-B14F-4D97-AF65-F5344CB8AC3E}">
-        <p14:creationId xmlns:p14="http://schemas.microsoft.com/office/powerpoint/2010/main" val="3938674021"/>
-      </p:ext>
-    </p:extLst>
-  </p:cSld>
-  <p:clrMapOvr>
-    <a:masterClrMapping/>
-  </p:clrMapOvr>
-</p:sld>
-</file>
-
-<file path=ppt/slides/slide6.xml><?xml version="1.0" encoding="utf-8"?>
 <p:sld xmlns:a="http://schemas.openxmlformats.org/drawingml/2006/main" xmlns:r="http://schemas.openxmlformats.org/officeDocument/2006/relationships" xmlns:p="http://schemas.openxmlformats.org/presentationml/2006/main">
   <p:cSld>
     <p:spTree>
@@ -7288,6 +6247,405 @@
 </p:sld>
 </file>
 
+<file path=ppt/slides/slide6.xml><?xml version="1.0" encoding="utf-8"?>
+<p:sld xmlns:a="http://schemas.openxmlformats.org/drawingml/2006/main" xmlns:r="http://schemas.openxmlformats.org/officeDocument/2006/relationships" xmlns:p="http://schemas.openxmlformats.org/presentationml/2006/main">
+  <p:cSld>
+    <p:spTree>
+      <p:nvGrpSpPr>
+        <p:cNvPr id="1" name=""/>
+        <p:cNvGrpSpPr/>
+        <p:nvPr/>
+      </p:nvGrpSpPr>
+      <p:grpSpPr>
+        <a:xfrm>
+          <a:off x="0" y="0"/>
+          <a:ext cx="0" cy="0"/>
+          <a:chOff x="0" y="0"/>
+          <a:chExt cx="0" cy="0"/>
+        </a:xfrm>
+      </p:grpSpPr>
+      <p:sp>
+        <p:nvSpPr>
+          <p:cNvPr id="2" name="Заголовок 1">
+            <a:extLst>
+              <a:ext uri="{FF2B5EF4-FFF2-40B4-BE49-F238E27FC236}">
+                <a16:creationId xmlns:a16="http://schemas.microsoft.com/office/drawing/2014/main" id="{1802D59D-6A83-151A-EEA2-678960399BE4}"/>
+              </a:ext>
+            </a:extLst>
+          </p:cNvPr>
+          <p:cNvSpPr>
+            <a:spLocks noGrp="1"/>
+          </p:cNvSpPr>
+          <p:nvPr>
+            <p:ph type="title"/>
+          </p:nvPr>
+        </p:nvSpPr>
+        <p:spPr>
+          <a:xfrm>
+            <a:off x="428016" y="-72232"/>
+            <a:ext cx="11763983" cy="1325563"/>
+          </a:xfrm>
+        </p:spPr>
+        <p:txBody>
+          <a:bodyPr>
+            <a:normAutofit/>
+          </a:bodyPr>
+          <a:lstStyle/>
+          <a:p>
+            <a:r>
+              <a:rPr lang="ru-RU" sz="4000" b="1" dirty="0"/>
+              <a:t>Алгоритм </a:t>
+            </a:r>
+            <a:r>
+              <a:rPr lang="en-US" sz="4000" b="1" dirty="0"/>
+              <a:t>GSP</a:t>
+            </a:r>
+            <a:endParaRPr lang="ru-RU" sz="4000" b="1" dirty="0"/>
+          </a:p>
+        </p:txBody>
+      </p:sp>
+      <p:sp>
+        <p:nvSpPr>
+          <p:cNvPr id="4" name="Номер слайда 3">
+            <a:extLst>
+              <a:ext uri="{FF2B5EF4-FFF2-40B4-BE49-F238E27FC236}">
+                <a16:creationId xmlns:a16="http://schemas.microsoft.com/office/drawing/2014/main" id="{80FEEFAF-0D6B-464C-7360-370FF23083CC}"/>
+              </a:ext>
+            </a:extLst>
+          </p:cNvPr>
+          <p:cNvSpPr>
+            <a:spLocks noGrp="1"/>
+          </p:cNvSpPr>
+          <p:nvPr>
+            <p:ph type="sldNum" sz="quarter" idx="12"/>
+          </p:nvPr>
+        </p:nvSpPr>
+        <p:spPr/>
+        <p:txBody>
+          <a:bodyPr/>
+          <a:lstStyle/>
+          <a:p>
+            <a:fld id="{E83D2FD5-BBDA-43D0-B172-791327EA2B6A}" type="slidenum">
+              <a:rPr lang="ru-RU" smtClean="0"/>
+              <a:t>6</a:t>
+            </a:fld>
+            <a:endParaRPr lang="ru-RU" dirty="0"/>
+          </a:p>
+        </p:txBody>
+      </p:sp>
+      <p:sp>
+        <p:nvSpPr>
+          <p:cNvPr id="7" name="Объект 2">
+            <a:extLst>
+              <a:ext uri="{FF2B5EF4-FFF2-40B4-BE49-F238E27FC236}">
+                <a16:creationId xmlns:a16="http://schemas.microsoft.com/office/drawing/2014/main" id="{6CF8E559-CCDE-49E5-93F5-28EC1006FB11}"/>
+              </a:ext>
+            </a:extLst>
+          </p:cNvPr>
+          <p:cNvSpPr>
+            <a:spLocks noGrp="1"/>
+          </p:cNvSpPr>
+          <p:nvPr>
+            <p:ph idx="1"/>
+          </p:nvPr>
+        </p:nvSpPr>
+        <p:spPr>
+          <a:xfrm>
+            <a:off x="428017" y="1253331"/>
+            <a:ext cx="11182378" cy="5168894"/>
+          </a:xfrm>
+        </p:spPr>
+        <p:txBody>
+          <a:bodyPr>
+            <a:noAutofit/>
+          </a:bodyPr>
+          <a:lstStyle/>
+          <a:p>
+            <a:pPr marL="571500" indent="-342900" algn="just">
+              <a:lnSpc>
+                <a:spcPct val="100000"/>
+              </a:lnSpc>
+            </a:pPr>
+            <a:r>
+              <a:rPr lang="ru-RU" sz="2600" dirty="0">
+                <a:latin typeface="Times New Roman" panose="02020603050405020304" pitchFamily="18" charset="0"/>
+                <a:ea typeface="Times New Roman" panose="02020603050405020304" pitchFamily="18" charset="0"/>
+              </a:rPr>
+              <a:t>является модификацией алгоритма </a:t>
+            </a:r>
+            <a:r>
+              <a:rPr lang="ru-RU" sz="2600" dirty="0" err="1">
+                <a:latin typeface="Times New Roman" panose="02020603050405020304" pitchFamily="18" charset="0"/>
+                <a:ea typeface="Times New Roman" panose="02020603050405020304" pitchFamily="18" charset="0"/>
+              </a:rPr>
+              <a:t>Apriori</a:t>
+            </a:r>
+            <a:r>
+              <a:rPr lang="en-US" sz="2600" dirty="0">
+                <a:latin typeface="Times New Roman" panose="02020603050405020304" pitchFamily="18" charset="0"/>
+                <a:ea typeface="Times New Roman" panose="02020603050405020304" pitchFamily="18" charset="0"/>
+              </a:rPr>
+              <a:t>All;</a:t>
+            </a:r>
+          </a:p>
+          <a:p>
+            <a:pPr marL="571500" indent="-342900" algn="just">
+              <a:lnSpc>
+                <a:spcPct val="100000"/>
+              </a:lnSpc>
+            </a:pPr>
+            <a:r>
+              <a:rPr lang="ru-RU" sz="2600" dirty="0">
+                <a:latin typeface="Times New Roman" panose="02020603050405020304" pitchFamily="18" charset="0"/>
+                <a:ea typeface="Times New Roman" panose="02020603050405020304" pitchFamily="18" charset="0"/>
+              </a:rPr>
+              <a:t>учитывает ограничения по времени между соседними транзакциями и </a:t>
+            </a:r>
+            <a:r>
+              <a:rPr lang="en-US" sz="2600" dirty="0">
+                <a:latin typeface="Times New Roman" panose="02020603050405020304" pitchFamily="18" charset="0"/>
+                <a:ea typeface="Times New Roman" panose="02020603050405020304" pitchFamily="18" charset="0"/>
+              </a:rPr>
+              <a:t>id </a:t>
+            </a:r>
+            <a:r>
+              <a:rPr lang="ru-RU" sz="2600" dirty="0">
+                <a:latin typeface="Times New Roman" panose="02020603050405020304" pitchFamily="18" charset="0"/>
+                <a:ea typeface="Times New Roman" panose="02020603050405020304" pitchFamily="18" charset="0"/>
+              </a:rPr>
+              <a:t>клиента совершившего ее</a:t>
+            </a:r>
+            <a:r>
+              <a:rPr lang="en-US" sz="2600" dirty="0">
+                <a:latin typeface="Times New Roman" panose="02020603050405020304" pitchFamily="18" charset="0"/>
+                <a:ea typeface="Times New Roman" panose="02020603050405020304" pitchFamily="18" charset="0"/>
+              </a:rPr>
+              <a:t>;</a:t>
+            </a:r>
+            <a:endParaRPr lang="ru-RU" sz="2600" dirty="0">
+              <a:latin typeface="Times New Roman" panose="02020603050405020304" pitchFamily="18" charset="0"/>
+              <a:ea typeface="Times New Roman" panose="02020603050405020304" pitchFamily="18" charset="0"/>
+            </a:endParaRPr>
+          </a:p>
+          <a:p>
+            <a:pPr marL="571500" indent="-342900">
+              <a:lnSpc>
+                <a:spcPct val="100000"/>
+              </a:lnSpc>
+            </a:pPr>
+            <a:r>
+              <a:rPr lang="ru-RU" sz="2600" dirty="0">
+                <a:latin typeface="Times New Roman" panose="02020603050405020304" pitchFamily="18" charset="0"/>
+                <a:ea typeface="Times New Roman" panose="02020603050405020304" pitchFamily="18" charset="0"/>
+              </a:rPr>
+              <a:t>поддержка последовательности - это отношение числа покупателей, в чьих транзакциях присутствует указанная последовательность к общему числу покупателей.</a:t>
+            </a:r>
+          </a:p>
+          <a:p>
+            <a:pPr indent="0" algn="just">
+              <a:lnSpc>
+                <a:spcPct val="100000"/>
+              </a:lnSpc>
+              <a:buNone/>
+            </a:pPr>
+            <a:r>
+              <a:rPr lang="ru-RU" sz="2600" dirty="0">
+                <a:solidFill>
+                  <a:schemeClr val="tx1">
+                    <a:lumMod val="95000"/>
+                    <a:lumOff val="5000"/>
+                  </a:schemeClr>
+                </a:solidFill>
+                <a:latin typeface="Times New Roman" panose="02020603050405020304" pitchFamily="18" charset="0"/>
+                <a:ea typeface="Times New Roman" panose="02020603050405020304" pitchFamily="18" charset="0"/>
+              </a:rPr>
+              <a:t>В работе алгоритма можно выделить следующие основные этапы:</a:t>
+            </a:r>
+            <a:endParaRPr lang="en-US" sz="2600" dirty="0">
+              <a:solidFill>
+                <a:schemeClr val="tx1">
+                  <a:lumMod val="95000"/>
+                  <a:lumOff val="5000"/>
+                </a:schemeClr>
+              </a:solidFill>
+              <a:latin typeface="Times New Roman" panose="02020603050405020304" pitchFamily="18" charset="0"/>
+              <a:ea typeface="Times New Roman" panose="02020603050405020304" pitchFamily="18" charset="0"/>
+            </a:endParaRPr>
+          </a:p>
+          <a:p>
+            <a:pPr indent="0">
+              <a:lnSpc>
+                <a:spcPct val="100000"/>
+              </a:lnSpc>
+              <a:buNone/>
+            </a:pPr>
+            <a:r>
+              <a:rPr lang="en-US" sz="2600" dirty="0">
+                <a:solidFill>
+                  <a:schemeClr val="tx1">
+                    <a:lumMod val="95000"/>
+                    <a:lumOff val="5000"/>
+                  </a:schemeClr>
+                </a:solidFill>
+                <a:latin typeface="Times New Roman" panose="02020603050405020304" pitchFamily="18" charset="0"/>
+                <a:cs typeface="Times New Roman" panose="02020603050405020304" pitchFamily="18" charset="0"/>
+              </a:rPr>
+              <a:t>	1. </a:t>
+            </a:r>
+            <a:r>
+              <a:rPr lang="ru-RU" sz="2600" dirty="0">
+                <a:solidFill>
+                  <a:schemeClr val="tx1">
+                    <a:lumMod val="95000"/>
+                    <a:lumOff val="5000"/>
+                  </a:schemeClr>
+                </a:solidFill>
+                <a:latin typeface="Times New Roman" panose="02020603050405020304" pitchFamily="18" charset="0"/>
+                <a:cs typeface="Times New Roman" panose="02020603050405020304" pitchFamily="18" charset="0"/>
+              </a:rPr>
+              <a:t>Генерация кандидатов.</a:t>
+            </a:r>
+            <a:br>
+              <a:rPr lang="en-US" sz="2600" dirty="0">
+                <a:solidFill>
+                  <a:schemeClr val="tx1">
+                    <a:lumMod val="95000"/>
+                    <a:lumOff val="5000"/>
+                  </a:schemeClr>
+                </a:solidFill>
+                <a:latin typeface="Times New Roman" panose="02020603050405020304" pitchFamily="18" charset="0"/>
+                <a:cs typeface="Times New Roman" panose="02020603050405020304" pitchFamily="18" charset="0"/>
+              </a:rPr>
+            </a:br>
+            <a:r>
+              <a:rPr lang="en-US" sz="2600" dirty="0">
+                <a:solidFill>
+                  <a:schemeClr val="tx1">
+                    <a:lumMod val="95000"/>
+                    <a:lumOff val="5000"/>
+                  </a:schemeClr>
+                </a:solidFill>
+                <a:latin typeface="Times New Roman" panose="02020603050405020304" pitchFamily="18" charset="0"/>
+                <a:cs typeface="Times New Roman" panose="02020603050405020304" pitchFamily="18" charset="0"/>
+              </a:rPr>
+              <a:t>	    1.1. </a:t>
+            </a:r>
+            <a:r>
+              <a:rPr lang="ru-RU" sz="2600" dirty="0">
+                <a:solidFill>
+                  <a:schemeClr val="tx1">
+                    <a:lumMod val="95000"/>
+                    <a:lumOff val="5000"/>
+                  </a:schemeClr>
+                </a:solidFill>
+                <a:latin typeface="Times New Roman" panose="02020603050405020304" pitchFamily="18" charset="0"/>
+                <a:cs typeface="Times New Roman" panose="02020603050405020304" pitchFamily="18" charset="0"/>
+              </a:rPr>
+              <a:t>Объединение.</a:t>
+            </a:r>
+            <a:br>
+              <a:rPr lang="en-US" sz="2600" dirty="0">
+                <a:solidFill>
+                  <a:schemeClr val="tx1">
+                    <a:lumMod val="95000"/>
+                    <a:lumOff val="5000"/>
+                  </a:schemeClr>
+                </a:solidFill>
+                <a:latin typeface="Times New Roman" panose="02020603050405020304" pitchFamily="18" charset="0"/>
+                <a:cs typeface="Times New Roman" panose="02020603050405020304" pitchFamily="18" charset="0"/>
+              </a:rPr>
+            </a:br>
+            <a:r>
+              <a:rPr lang="en-US" sz="2600" dirty="0">
+                <a:solidFill>
+                  <a:schemeClr val="tx1">
+                    <a:lumMod val="95000"/>
+                    <a:lumOff val="5000"/>
+                  </a:schemeClr>
+                </a:solidFill>
+                <a:latin typeface="Times New Roman" panose="02020603050405020304" pitchFamily="18" charset="0"/>
+                <a:cs typeface="Times New Roman" panose="02020603050405020304" pitchFamily="18" charset="0"/>
+              </a:rPr>
+              <a:t>	    1.2. </a:t>
+            </a:r>
+            <a:r>
+              <a:rPr lang="ru-RU" sz="2600" dirty="0">
+                <a:solidFill>
+                  <a:schemeClr val="tx1">
+                    <a:lumMod val="95000"/>
+                    <a:lumOff val="5000"/>
+                  </a:schemeClr>
+                </a:solidFill>
+                <a:latin typeface="Times New Roman" panose="02020603050405020304" pitchFamily="18" charset="0"/>
+                <a:cs typeface="Times New Roman" panose="02020603050405020304" pitchFamily="18" charset="0"/>
+              </a:rPr>
+              <a:t>Упрощение.</a:t>
+            </a:r>
+            <a:br>
+              <a:rPr lang="en-US" sz="2600" dirty="0">
+                <a:solidFill>
+                  <a:schemeClr val="tx1">
+                    <a:lumMod val="95000"/>
+                    <a:lumOff val="5000"/>
+                  </a:schemeClr>
+                </a:solidFill>
+                <a:latin typeface="Times New Roman" panose="02020603050405020304" pitchFamily="18" charset="0"/>
+                <a:cs typeface="Times New Roman" panose="02020603050405020304" pitchFamily="18" charset="0"/>
+              </a:rPr>
+            </a:br>
+            <a:r>
+              <a:rPr lang="en-US" sz="2600" dirty="0">
+                <a:solidFill>
+                  <a:schemeClr val="tx1">
+                    <a:lumMod val="95000"/>
+                    <a:lumOff val="5000"/>
+                  </a:schemeClr>
+                </a:solidFill>
+                <a:latin typeface="Times New Roman" panose="02020603050405020304" pitchFamily="18" charset="0"/>
+                <a:cs typeface="Times New Roman" panose="02020603050405020304" pitchFamily="18" charset="0"/>
+              </a:rPr>
+              <a:t>	2. </a:t>
+            </a:r>
+            <a:r>
+              <a:rPr lang="ru-RU" sz="2600" dirty="0">
+                <a:solidFill>
+                  <a:schemeClr val="tx1">
+                    <a:lumMod val="95000"/>
+                    <a:lumOff val="5000"/>
+                  </a:schemeClr>
+                </a:solidFill>
+                <a:latin typeface="Times New Roman" panose="02020603050405020304" pitchFamily="18" charset="0"/>
+                <a:cs typeface="Times New Roman" panose="02020603050405020304" pitchFamily="18" charset="0"/>
+              </a:rPr>
+              <a:t>Подсчет поддержки кандидатов.</a:t>
+            </a:r>
+            <a:endParaRPr lang="en-US" sz="2600" dirty="0">
+              <a:solidFill>
+                <a:schemeClr val="tx1">
+                  <a:lumMod val="95000"/>
+                  <a:lumOff val="5000"/>
+                </a:schemeClr>
+              </a:solidFill>
+              <a:latin typeface="Times New Roman" panose="02020603050405020304" pitchFamily="18" charset="0"/>
+              <a:ea typeface="Times New Roman" panose="02020603050405020304" pitchFamily="18" charset="0"/>
+              <a:cs typeface="Times New Roman" panose="02020603050405020304" pitchFamily="18" charset="0"/>
+            </a:endParaRPr>
+          </a:p>
+        </p:txBody>
+      </p:sp>
+    </p:spTree>
+    <p:extLst>
+      <p:ext uri="{BB962C8B-B14F-4D97-AF65-F5344CB8AC3E}">
+        <p14:creationId xmlns:p14="http://schemas.microsoft.com/office/powerpoint/2010/main" val="2834239968"/>
+      </p:ext>
+    </p:extLst>
+  </p:cSld>
+  <p:clrMapOvr>
+    <a:masterClrMapping/>
+  </p:clrMapOvr>
+</p:sld>
+</file>
+
 <file path=ppt/slides/slide7.xml><?xml version="1.0" encoding="utf-8"?>
 <p:sld xmlns:a="http://schemas.openxmlformats.org/drawingml/2006/main" xmlns:r="http://schemas.openxmlformats.org/officeDocument/2006/relationships" xmlns:p="http://schemas.openxmlformats.org/presentationml/2006/main">
   <p:cSld>
@@ -7335,7 +6693,7 @@
           <a:p>
             <a:r>
               <a:rPr lang="ru-RU" sz="4000" b="1" dirty="0"/>
-              <a:t>Алгоритм </a:t>
+              <a:t>Пример работы алгоритма </a:t>
             </a:r>
             <a:r>
               <a:rPr lang="en-US" sz="4000" b="1" dirty="0"/>
@@ -7369,405 +6727,6 @@
             <a:fld id="{E83D2FD5-BBDA-43D0-B172-791327EA2B6A}" type="slidenum">
               <a:rPr lang="ru-RU" smtClean="0"/>
               <a:t>7</a:t>
-            </a:fld>
-            <a:endParaRPr lang="ru-RU" dirty="0"/>
-          </a:p>
-        </p:txBody>
-      </p:sp>
-      <p:sp>
-        <p:nvSpPr>
-          <p:cNvPr id="7" name="Объект 2">
-            <a:extLst>
-              <a:ext uri="{FF2B5EF4-FFF2-40B4-BE49-F238E27FC236}">
-                <a16:creationId xmlns:a16="http://schemas.microsoft.com/office/drawing/2014/main" id="{6CF8E559-CCDE-49E5-93F5-28EC1006FB11}"/>
-              </a:ext>
-            </a:extLst>
-          </p:cNvPr>
-          <p:cNvSpPr>
-            <a:spLocks noGrp="1"/>
-          </p:cNvSpPr>
-          <p:nvPr>
-            <p:ph idx="1"/>
-          </p:nvPr>
-        </p:nvSpPr>
-        <p:spPr>
-          <a:xfrm>
-            <a:off x="428017" y="1253331"/>
-            <a:ext cx="11182378" cy="5168894"/>
-          </a:xfrm>
-        </p:spPr>
-        <p:txBody>
-          <a:bodyPr>
-            <a:noAutofit/>
-          </a:bodyPr>
-          <a:lstStyle/>
-          <a:p>
-            <a:pPr marL="571500" indent="-342900" algn="just">
-              <a:lnSpc>
-                <a:spcPct val="100000"/>
-              </a:lnSpc>
-            </a:pPr>
-            <a:r>
-              <a:rPr lang="ru-RU" sz="2200" dirty="0">
-                <a:latin typeface="Times New Roman" panose="02020603050405020304" pitchFamily="18" charset="0"/>
-                <a:ea typeface="Times New Roman" panose="02020603050405020304" pitchFamily="18" charset="0"/>
-              </a:rPr>
-              <a:t>является модификацией алгоритма </a:t>
-            </a:r>
-            <a:r>
-              <a:rPr lang="ru-RU" sz="2200" dirty="0" err="1">
-                <a:latin typeface="Times New Roman" panose="02020603050405020304" pitchFamily="18" charset="0"/>
-                <a:ea typeface="Times New Roman" panose="02020603050405020304" pitchFamily="18" charset="0"/>
-              </a:rPr>
-              <a:t>Apriori</a:t>
-            </a:r>
-            <a:r>
-              <a:rPr lang="en-US" sz="2200" dirty="0">
-                <a:latin typeface="Times New Roman" panose="02020603050405020304" pitchFamily="18" charset="0"/>
-                <a:ea typeface="Times New Roman" panose="02020603050405020304" pitchFamily="18" charset="0"/>
-              </a:rPr>
-              <a:t>All;</a:t>
-            </a:r>
-          </a:p>
-          <a:p>
-            <a:pPr marL="571500" indent="-342900" algn="just">
-              <a:lnSpc>
-                <a:spcPct val="100000"/>
-              </a:lnSpc>
-            </a:pPr>
-            <a:r>
-              <a:rPr lang="ru-RU" sz="2200" dirty="0">
-                <a:latin typeface="Times New Roman" panose="02020603050405020304" pitchFamily="18" charset="0"/>
-                <a:ea typeface="Times New Roman" panose="02020603050405020304" pitchFamily="18" charset="0"/>
-              </a:rPr>
-              <a:t>учитывает ограничения по времени между соседними транзакциями и </a:t>
-            </a:r>
-            <a:r>
-              <a:rPr lang="en-US" sz="2200" dirty="0">
-                <a:latin typeface="Times New Roman" panose="02020603050405020304" pitchFamily="18" charset="0"/>
-                <a:ea typeface="Times New Roman" panose="02020603050405020304" pitchFamily="18" charset="0"/>
-              </a:rPr>
-              <a:t>id </a:t>
-            </a:r>
-            <a:r>
-              <a:rPr lang="ru-RU" sz="2200" dirty="0">
-                <a:latin typeface="Times New Roman" panose="02020603050405020304" pitchFamily="18" charset="0"/>
-                <a:ea typeface="Times New Roman" panose="02020603050405020304" pitchFamily="18" charset="0"/>
-              </a:rPr>
-              <a:t>клиента совершившего ее</a:t>
-            </a:r>
-            <a:r>
-              <a:rPr lang="en-US" sz="2200" dirty="0">
-                <a:latin typeface="Times New Roman" panose="02020603050405020304" pitchFamily="18" charset="0"/>
-                <a:ea typeface="Times New Roman" panose="02020603050405020304" pitchFamily="18" charset="0"/>
-              </a:rPr>
-              <a:t>;</a:t>
-            </a:r>
-            <a:endParaRPr lang="ru-RU" sz="2200" dirty="0">
-              <a:latin typeface="Times New Roman" panose="02020603050405020304" pitchFamily="18" charset="0"/>
-              <a:ea typeface="Times New Roman" panose="02020603050405020304" pitchFamily="18" charset="0"/>
-            </a:endParaRPr>
-          </a:p>
-          <a:p>
-            <a:pPr marL="571500" indent="-342900">
-              <a:lnSpc>
-                <a:spcPct val="100000"/>
-              </a:lnSpc>
-            </a:pPr>
-            <a:r>
-              <a:rPr lang="ru-RU" sz="2200" dirty="0">
-                <a:latin typeface="Times New Roman" panose="02020603050405020304" pitchFamily="18" charset="0"/>
-                <a:ea typeface="Times New Roman" panose="02020603050405020304" pitchFamily="18" charset="0"/>
-              </a:rPr>
-              <a:t>поддержка последовательности - это отношение числа покупателей, в чьих транзакциях присутствует указанная последовательность к общему числу покупателей.</a:t>
-            </a:r>
-          </a:p>
-          <a:p>
-            <a:pPr indent="0" algn="just">
-              <a:lnSpc>
-                <a:spcPct val="100000"/>
-              </a:lnSpc>
-              <a:buNone/>
-            </a:pPr>
-            <a:r>
-              <a:rPr lang="ru-RU" sz="2200" dirty="0">
-                <a:solidFill>
-                  <a:schemeClr val="tx1">
-                    <a:lumMod val="95000"/>
-                    <a:lumOff val="5000"/>
-                  </a:schemeClr>
-                </a:solidFill>
-                <a:latin typeface="Times New Roman" panose="02020603050405020304" pitchFamily="18" charset="0"/>
-                <a:ea typeface="Times New Roman" panose="02020603050405020304" pitchFamily="18" charset="0"/>
-              </a:rPr>
-              <a:t>В работе алгоритма можно выделить следующие основные этапы:</a:t>
-            </a:r>
-            <a:endParaRPr lang="en-US" sz="2200" dirty="0">
-              <a:solidFill>
-                <a:schemeClr val="tx1">
-                  <a:lumMod val="95000"/>
-                  <a:lumOff val="5000"/>
-                </a:schemeClr>
-              </a:solidFill>
-              <a:latin typeface="Times New Roman" panose="02020603050405020304" pitchFamily="18" charset="0"/>
-              <a:ea typeface="Times New Roman" panose="02020603050405020304" pitchFamily="18" charset="0"/>
-            </a:endParaRPr>
-          </a:p>
-          <a:p>
-            <a:pPr indent="0">
-              <a:lnSpc>
-                <a:spcPct val="100000"/>
-              </a:lnSpc>
-              <a:buNone/>
-            </a:pPr>
-            <a:r>
-              <a:rPr lang="en-US" sz="2200" dirty="0">
-                <a:solidFill>
-                  <a:schemeClr val="tx1">
-                    <a:lumMod val="95000"/>
-                    <a:lumOff val="5000"/>
-                  </a:schemeClr>
-                </a:solidFill>
-                <a:latin typeface="Times New Roman" panose="02020603050405020304" pitchFamily="18" charset="0"/>
-                <a:cs typeface="Times New Roman" panose="02020603050405020304" pitchFamily="18" charset="0"/>
-              </a:rPr>
-              <a:t>	1. </a:t>
-            </a:r>
-            <a:r>
-              <a:rPr lang="ru-RU" sz="2200" dirty="0">
-                <a:solidFill>
-                  <a:schemeClr val="tx1">
-                    <a:lumMod val="95000"/>
-                    <a:lumOff val="5000"/>
-                  </a:schemeClr>
-                </a:solidFill>
-                <a:latin typeface="Times New Roman" panose="02020603050405020304" pitchFamily="18" charset="0"/>
-                <a:cs typeface="Times New Roman" panose="02020603050405020304" pitchFamily="18" charset="0"/>
-              </a:rPr>
-              <a:t>Генерация кандидатов.</a:t>
-            </a:r>
-            <a:br>
-              <a:rPr lang="en-US" sz="2200" dirty="0">
-                <a:solidFill>
-                  <a:schemeClr val="tx1">
-                    <a:lumMod val="95000"/>
-                    <a:lumOff val="5000"/>
-                  </a:schemeClr>
-                </a:solidFill>
-                <a:latin typeface="Times New Roman" panose="02020603050405020304" pitchFamily="18" charset="0"/>
-                <a:cs typeface="Times New Roman" panose="02020603050405020304" pitchFamily="18" charset="0"/>
-              </a:rPr>
-            </a:br>
-            <a:r>
-              <a:rPr lang="en-US" sz="2200" dirty="0">
-                <a:solidFill>
-                  <a:schemeClr val="tx1">
-                    <a:lumMod val="95000"/>
-                    <a:lumOff val="5000"/>
-                  </a:schemeClr>
-                </a:solidFill>
-                <a:latin typeface="Times New Roman" panose="02020603050405020304" pitchFamily="18" charset="0"/>
-                <a:cs typeface="Times New Roman" panose="02020603050405020304" pitchFamily="18" charset="0"/>
-              </a:rPr>
-              <a:t>	    1.1. </a:t>
-            </a:r>
-            <a:r>
-              <a:rPr lang="ru-RU" sz="2200" dirty="0">
-                <a:solidFill>
-                  <a:schemeClr val="tx1">
-                    <a:lumMod val="95000"/>
-                    <a:lumOff val="5000"/>
-                  </a:schemeClr>
-                </a:solidFill>
-                <a:latin typeface="Times New Roman" panose="02020603050405020304" pitchFamily="18" charset="0"/>
-                <a:cs typeface="Times New Roman" panose="02020603050405020304" pitchFamily="18" charset="0"/>
-              </a:rPr>
-              <a:t>Объединение.</a:t>
-            </a:r>
-            <a:br>
-              <a:rPr lang="en-US" sz="2200" dirty="0">
-                <a:solidFill>
-                  <a:schemeClr val="tx1">
-                    <a:lumMod val="95000"/>
-                    <a:lumOff val="5000"/>
-                  </a:schemeClr>
-                </a:solidFill>
-                <a:latin typeface="Times New Roman" panose="02020603050405020304" pitchFamily="18" charset="0"/>
-                <a:cs typeface="Times New Roman" panose="02020603050405020304" pitchFamily="18" charset="0"/>
-              </a:rPr>
-            </a:br>
-            <a:r>
-              <a:rPr lang="en-US" sz="2200" dirty="0">
-                <a:solidFill>
-                  <a:schemeClr val="tx1">
-                    <a:lumMod val="95000"/>
-                    <a:lumOff val="5000"/>
-                  </a:schemeClr>
-                </a:solidFill>
-                <a:latin typeface="Times New Roman" panose="02020603050405020304" pitchFamily="18" charset="0"/>
-                <a:cs typeface="Times New Roman" panose="02020603050405020304" pitchFamily="18" charset="0"/>
-              </a:rPr>
-              <a:t>	    1.2. </a:t>
-            </a:r>
-            <a:r>
-              <a:rPr lang="ru-RU" sz="2200" dirty="0">
-                <a:solidFill>
-                  <a:schemeClr val="tx1">
-                    <a:lumMod val="95000"/>
-                    <a:lumOff val="5000"/>
-                  </a:schemeClr>
-                </a:solidFill>
-                <a:latin typeface="Times New Roman" panose="02020603050405020304" pitchFamily="18" charset="0"/>
-                <a:cs typeface="Times New Roman" panose="02020603050405020304" pitchFamily="18" charset="0"/>
-              </a:rPr>
-              <a:t>Упрощение.</a:t>
-            </a:r>
-            <a:br>
-              <a:rPr lang="en-US" sz="2200" dirty="0">
-                <a:solidFill>
-                  <a:schemeClr val="tx1">
-                    <a:lumMod val="95000"/>
-                    <a:lumOff val="5000"/>
-                  </a:schemeClr>
-                </a:solidFill>
-                <a:latin typeface="Times New Roman" panose="02020603050405020304" pitchFamily="18" charset="0"/>
-                <a:cs typeface="Times New Roman" panose="02020603050405020304" pitchFamily="18" charset="0"/>
-              </a:rPr>
-            </a:br>
-            <a:r>
-              <a:rPr lang="en-US" sz="2200" dirty="0">
-                <a:solidFill>
-                  <a:schemeClr val="tx1">
-                    <a:lumMod val="95000"/>
-                    <a:lumOff val="5000"/>
-                  </a:schemeClr>
-                </a:solidFill>
-                <a:latin typeface="Times New Roman" panose="02020603050405020304" pitchFamily="18" charset="0"/>
-                <a:cs typeface="Times New Roman" panose="02020603050405020304" pitchFamily="18" charset="0"/>
-              </a:rPr>
-              <a:t>	2. </a:t>
-            </a:r>
-            <a:r>
-              <a:rPr lang="ru-RU" sz="2200" dirty="0">
-                <a:solidFill>
-                  <a:schemeClr val="tx1">
-                    <a:lumMod val="95000"/>
-                    <a:lumOff val="5000"/>
-                  </a:schemeClr>
-                </a:solidFill>
-                <a:latin typeface="Times New Roman" panose="02020603050405020304" pitchFamily="18" charset="0"/>
-                <a:cs typeface="Times New Roman" panose="02020603050405020304" pitchFamily="18" charset="0"/>
-              </a:rPr>
-              <a:t>Подсчет поддержки кандидатов.</a:t>
-            </a:r>
-            <a:endParaRPr lang="en-US" sz="2200" dirty="0">
-              <a:solidFill>
-                <a:schemeClr val="tx1">
-                  <a:lumMod val="95000"/>
-                  <a:lumOff val="5000"/>
-                </a:schemeClr>
-              </a:solidFill>
-              <a:latin typeface="Times New Roman" panose="02020603050405020304" pitchFamily="18" charset="0"/>
-              <a:ea typeface="Times New Roman" panose="02020603050405020304" pitchFamily="18" charset="0"/>
-              <a:cs typeface="Times New Roman" panose="02020603050405020304" pitchFamily="18" charset="0"/>
-            </a:endParaRPr>
-          </a:p>
-        </p:txBody>
-      </p:sp>
-    </p:spTree>
-    <p:extLst>
-      <p:ext uri="{BB962C8B-B14F-4D97-AF65-F5344CB8AC3E}">
-        <p14:creationId xmlns:p14="http://schemas.microsoft.com/office/powerpoint/2010/main" val="2834239968"/>
-      </p:ext>
-    </p:extLst>
-  </p:cSld>
-  <p:clrMapOvr>
-    <a:masterClrMapping/>
-  </p:clrMapOvr>
-</p:sld>
-</file>
-
-<file path=ppt/slides/slide8.xml><?xml version="1.0" encoding="utf-8"?>
-<p:sld xmlns:a="http://schemas.openxmlformats.org/drawingml/2006/main" xmlns:r="http://schemas.openxmlformats.org/officeDocument/2006/relationships" xmlns:p="http://schemas.openxmlformats.org/presentationml/2006/main">
-  <p:cSld>
-    <p:spTree>
-      <p:nvGrpSpPr>
-        <p:cNvPr id="1" name=""/>
-        <p:cNvGrpSpPr/>
-        <p:nvPr/>
-      </p:nvGrpSpPr>
-      <p:grpSpPr>
-        <a:xfrm>
-          <a:off x="0" y="0"/>
-          <a:ext cx="0" cy="0"/>
-          <a:chOff x="0" y="0"/>
-          <a:chExt cx="0" cy="0"/>
-        </a:xfrm>
-      </p:grpSpPr>
-      <p:sp>
-        <p:nvSpPr>
-          <p:cNvPr id="2" name="Заголовок 1">
-            <a:extLst>
-              <a:ext uri="{FF2B5EF4-FFF2-40B4-BE49-F238E27FC236}">
-                <a16:creationId xmlns:a16="http://schemas.microsoft.com/office/drawing/2014/main" id="{1802D59D-6A83-151A-EEA2-678960399BE4}"/>
-              </a:ext>
-            </a:extLst>
-          </p:cNvPr>
-          <p:cNvSpPr>
-            <a:spLocks noGrp="1"/>
-          </p:cNvSpPr>
-          <p:nvPr>
-            <p:ph type="title"/>
-          </p:nvPr>
-        </p:nvSpPr>
-        <p:spPr>
-          <a:xfrm>
-            <a:off x="428016" y="-72232"/>
-            <a:ext cx="11763983" cy="1325563"/>
-          </a:xfrm>
-        </p:spPr>
-        <p:txBody>
-          <a:bodyPr>
-            <a:normAutofit/>
-          </a:bodyPr>
-          <a:lstStyle/>
-          <a:p>
-            <a:r>
-              <a:rPr lang="ru-RU" sz="4000" b="1" dirty="0"/>
-              <a:t>Пример работы алгоритма </a:t>
-            </a:r>
-            <a:r>
-              <a:rPr lang="en-US" sz="4000" b="1" dirty="0"/>
-              <a:t>GSP</a:t>
-            </a:r>
-            <a:endParaRPr lang="ru-RU" sz="4000" b="1" dirty="0"/>
-          </a:p>
-        </p:txBody>
-      </p:sp>
-      <p:sp>
-        <p:nvSpPr>
-          <p:cNvPr id="4" name="Номер слайда 3">
-            <a:extLst>
-              <a:ext uri="{FF2B5EF4-FFF2-40B4-BE49-F238E27FC236}">
-                <a16:creationId xmlns:a16="http://schemas.microsoft.com/office/drawing/2014/main" id="{80FEEFAF-0D6B-464C-7360-370FF23083CC}"/>
-              </a:ext>
-            </a:extLst>
-          </p:cNvPr>
-          <p:cNvSpPr>
-            <a:spLocks noGrp="1"/>
-          </p:cNvSpPr>
-          <p:nvPr>
-            <p:ph type="sldNum" sz="quarter" idx="12"/>
-          </p:nvPr>
-        </p:nvSpPr>
-        <p:spPr/>
-        <p:txBody>
-          <a:bodyPr/>
-          <a:lstStyle/>
-          <a:p>
-            <a:fld id="{E83D2FD5-BBDA-43D0-B172-791327EA2B6A}" type="slidenum">
-              <a:rPr lang="ru-RU" smtClean="0"/>
-              <a:t>8</a:t>
             </a:fld>
             <a:endParaRPr lang="ru-RU" dirty="0"/>
           </a:p>
@@ -7980,8 +6939,8 @@
           </a:p>
         </p:txBody>
       </p:sp>
-      <mc:AlternateContent xmlns:mc="http://schemas.openxmlformats.org/markup-compatibility/2006" xmlns:a14="http://schemas.microsoft.com/office/drawing/2010/main">
-        <mc:Choice Requires="a14">
+      <mc:AlternateContent xmlns:mc="http://schemas.openxmlformats.org/markup-compatibility/2006">
+        <mc:Choice xmlns:a14="http://schemas.microsoft.com/office/drawing/2010/main" Requires="a14">
           <p:sp>
             <p:nvSpPr>
               <p:cNvPr id="17" name="Объект 2">
@@ -8336,14 +7295,6 @@
                   </a:rPr>
                   <a:t>удаляем ⟨{1, 2} {3} {5}⟩</a:t>
                 </a:r>
-              </a:p>
-              <a:p>
-                <a:pPr indent="0">
-                  <a:lnSpc>
-                    <a:spcPct val="100000"/>
-                  </a:lnSpc>
-                  <a:buNone/>
-                </a:pPr>
                 <a:endParaRPr lang="ru-RU" sz="2200" dirty="0">
                   <a:latin typeface="Times New Roman" panose="02020603050405020304" pitchFamily="18" charset="0"/>
                   <a:ea typeface="Times New Roman" panose="02020603050405020304" pitchFamily="18" charset="0"/>
@@ -8353,7 +7304,7 @@
             </p:txBody>
           </p:sp>
         </mc:Choice>
-        <mc:Fallback xmlns="">
+        <mc:Fallback>
           <p:sp>
             <p:nvSpPr>
               <p:cNvPr id="17" name="Объект 2">
@@ -12674,6 +11625,217 @@
 </p:sld>
 </file>
 
+<file path=ppt/slides/slide8.xml><?xml version="1.0" encoding="utf-8"?>
+<p:sld xmlns:a="http://schemas.openxmlformats.org/drawingml/2006/main" xmlns:r="http://schemas.openxmlformats.org/officeDocument/2006/relationships" xmlns:p="http://schemas.openxmlformats.org/presentationml/2006/main">
+  <p:cSld>
+    <p:spTree>
+      <p:nvGrpSpPr>
+        <p:cNvPr id="1" name=""/>
+        <p:cNvGrpSpPr/>
+        <p:nvPr/>
+      </p:nvGrpSpPr>
+      <p:grpSpPr>
+        <a:xfrm>
+          <a:off x="0" y="0"/>
+          <a:ext cx="0" cy="0"/>
+          <a:chOff x="0" y="0"/>
+          <a:chExt cx="0" cy="0"/>
+        </a:xfrm>
+      </p:grpSpPr>
+      <p:sp>
+        <p:nvSpPr>
+          <p:cNvPr id="2" name="Заголовок 1">
+            <a:extLst>
+              <a:ext uri="{FF2B5EF4-FFF2-40B4-BE49-F238E27FC236}">
+                <a16:creationId xmlns:a16="http://schemas.microsoft.com/office/drawing/2014/main" id="{1802D59D-6A83-151A-EEA2-678960399BE4}"/>
+              </a:ext>
+            </a:extLst>
+          </p:cNvPr>
+          <p:cNvSpPr>
+            <a:spLocks noGrp="1"/>
+          </p:cNvSpPr>
+          <p:nvPr>
+            <p:ph type="title"/>
+          </p:nvPr>
+        </p:nvSpPr>
+        <p:spPr>
+          <a:xfrm>
+            <a:off x="428017" y="-72232"/>
+            <a:ext cx="10515600" cy="1325563"/>
+          </a:xfrm>
+        </p:spPr>
+        <p:txBody>
+          <a:bodyPr>
+            <a:normAutofit/>
+          </a:bodyPr>
+          <a:lstStyle/>
+          <a:p>
+            <a:r>
+              <a:rPr lang="ru-RU" sz="4000" b="1" dirty="0"/>
+              <a:t>Метод оценки эффективности интерфейса GOMS</a:t>
+            </a:r>
+          </a:p>
+        </p:txBody>
+      </p:sp>
+      <p:sp>
+        <p:nvSpPr>
+          <p:cNvPr id="3" name="Объект 2">
+            <a:extLst>
+              <a:ext uri="{FF2B5EF4-FFF2-40B4-BE49-F238E27FC236}">
+                <a16:creationId xmlns:a16="http://schemas.microsoft.com/office/drawing/2014/main" id="{68541323-2632-074C-E69F-FC80AB230174}"/>
+              </a:ext>
+            </a:extLst>
+          </p:cNvPr>
+          <p:cNvSpPr>
+            <a:spLocks noGrp="1"/>
+          </p:cNvSpPr>
+          <p:nvPr>
+            <p:ph idx="1"/>
+          </p:nvPr>
+        </p:nvSpPr>
+        <p:spPr>
+          <a:xfrm>
+            <a:off x="428017" y="1253331"/>
+            <a:ext cx="11182378" cy="5168894"/>
+          </a:xfrm>
+        </p:spPr>
+        <p:txBody>
+          <a:bodyPr>
+            <a:noAutofit/>
+          </a:bodyPr>
+          <a:lstStyle/>
+          <a:p>
+            <a:r>
+              <a:rPr lang="ru-RU" sz="2600" dirty="0">
+                <a:latin typeface="Times New Roman" panose="02020603050405020304" pitchFamily="18" charset="0"/>
+                <a:cs typeface="Times New Roman" panose="02020603050405020304" pitchFamily="18" charset="0"/>
+              </a:rPr>
+              <a:t>включает в себя модель </a:t>
+            </a:r>
+            <a:r>
+              <a:rPr lang="en-US" sz="2600" dirty="0">
+                <a:latin typeface="Times New Roman" panose="02020603050405020304" pitchFamily="18" charset="0"/>
+                <a:cs typeface="Times New Roman" panose="02020603050405020304" pitchFamily="18" charset="0"/>
+              </a:rPr>
+              <a:t>Keystroke-level Model (KLM)</a:t>
+            </a:r>
+            <a:endParaRPr lang="ru-RU" sz="2600" dirty="0">
+              <a:latin typeface="Times New Roman" panose="02020603050405020304" pitchFamily="18" charset="0"/>
+              <a:cs typeface="Times New Roman" panose="02020603050405020304" pitchFamily="18" charset="0"/>
+            </a:endParaRPr>
+          </a:p>
+          <a:p>
+            <a:r>
+              <a:rPr lang="en-US" sz="2600" dirty="0">
+                <a:latin typeface="Times New Roman" panose="02020603050405020304" pitchFamily="18" charset="0"/>
+                <a:cs typeface="Times New Roman" panose="02020603050405020304" pitchFamily="18" charset="0"/>
+              </a:rPr>
+              <a:t>KLM </a:t>
+            </a:r>
+            <a:r>
+              <a:rPr lang="ru-RU" sz="2600" dirty="0">
+                <a:latin typeface="Times New Roman" panose="02020603050405020304" pitchFamily="18" charset="0"/>
+                <a:cs typeface="Times New Roman" panose="02020603050405020304" pitchFamily="18" charset="0"/>
+              </a:rPr>
+              <a:t>выделяет элементарные задачи и длительность каждой из них (рассчитанные на основе усредненных данных лабораторных испытаний). Например</a:t>
+            </a:r>
+            <a:r>
+              <a:rPr lang="en-US" sz="2600" dirty="0">
+                <a:latin typeface="Times New Roman" panose="02020603050405020304" pitchFamily="18" charset="0"/>
+                <a:cs typeface="Times New Roman" panose="02020603050405020304" pitchFamily="18" charset="0"/>
+              </a:rPr>
+              <a:t>,</a:t>
+            </a:r>
+            <a:r>
+              <a:rPr lang="ru-RU" sz="2600" dirty="0">
+                <a:latin typeface="Times New Roman" panose="02020603050405020304" pitchFamily="18" charset="0"/>
+                <a:cs typeface="Times New Roman" panose="02020603050405020304" pitchFamily="18" charset="0"/>
+              </a:rPr>
+              <a:t> P – указание курсором мыши на объект</a:t>
+            </a:r>
+            <a:r>
+              <a:rPr lang="en-US" sz="2600" dirty="0">
+                <a:latin typeface="Times New Roman" panose="02020603050405020304" pitchFamily="18" charset="0"/>
+                <a:cs typeface="Times New Roman" panose="02020603050405020304" pitchFamily="18" charset="0"/>
+              </a:rPr>
+              <a:t> </a:t>
+            </a:r>
+            <a:r>
+              <a:rPr lang="ru-RU" sz="2600" dirty="0">
+                <a:latin typeface="Times New Roman" panose="02020603050405020304" pitchFamily="18" charset="0"/>
+                <a:cs typeface="Times New Roman" panose="02020603050405020304" pitchFamily="18" charset="0"/>
+              </a:rPr>
+              <a:t>–</a:t>
+            </a:r>
+            <a:r>
+              <a:rPr lang="en-US" sz="2600" dirty="0">
+                <a:latin typeface="Times New Roman" panose="02020603050405020304" pitchFamily="18" charset="0"/>
+                <a:cs typeface="Times New Roman" panose="02020603050405020304" pitchFamily="18" charset="0"/>
+              </a:rPr>
+              <a:t> </a:t>
+            </a:r>
+            <a:r>
+              <a:rPr lang="ru-RU" sz="2600" dirty="0">
+                <a:latin typeface="Times New Roman" panose="02020603050405020304" pitchFamily="18" charset="0"/>
+                <a:cs typeface="Times New Roman" panose="02020603050405020304" pitchFamily="18" charset="0"/>
+              </a:rPr>
+              <a:t>1.1 сек. и B – нажатие или отпускание мыши – 0.1 сек.</a:t>
+            </a:r>
+          </a:p>
+          <a:p>
+            <a:r>
+              <a:rPr lang="ru-RU" sz="2600" dirty="0">
+                <a:latin typeface="Times New Roman" panose="02020603050405020304" pitchFamily="18" charset="0"/>
+                <a:ea typeface="Times New Roman" panose="02020603050405020304" pitchFamily="18" charset="0"/>
+                <a:cs typeface="Times New Roman" panose="02020603050405020304" pitchFamily="18" charset="0"/>
+              </a:rPr>
+              <a:t>оценка времени на решение задачи сводится к сложению продолжительностей каждой из простейших составляющих. Например, задача, состоящая из классов 〈P, P, B〉, потребует для завершения 2.3 сек. (1.1 сек. + 1.1 сек. + 0.1 сек.).</a:t>
+            </a:r>
+          </a:p>
+        </p:txBody>
+      </p:sp>
+      <p:sp>
+        <p:nvSpPr>
+          <p:cNvPr id="4" name="Номер слайда 3">
+            <a:extLst>
+              <a:ext uri="{FF2B5EF4-FFF2-40B4-BE49-F238E27FC236}">
+                <a16:creationId xmlns:a16="http://schemas.microsoft.com/office/drawing/2014/main" id="{80FEEFAF-0D6B-464C-7360-370FF23083CC}"/>
+              </a:ext>
+            </a:extLst>
+          </p:cNvPr>
+          <p:cNvSpPr>
+            <a:spLocks noGrp="1"/>
+          </p:cNvSpPr>
+          <p:nvPr>
+            <p:ph type="sldNum" sz="quarter" idx="12"/>
+          </p:nvPr>
+        </p:nvSpPr>
+        <p:spPr/>
+        <p:txBody>
+          <a:bodyPr/>
+          <a:lstStyle/>
+          <a:p>
+            <a:fld id="{E83D2FD5-BBDA-43D0-B172-791327EA2B6A}" type="slidenum">
+              <a:rPr lang="ru-RU" smtClean="0"/>
+              <a:t>8</a:t>
+            </a:fld>
+            <a:endParaRPr lang="ru-RU" dirty="0"/>
+          </a:p>
+        </p:txBody>
+      </p:sp>
+    </p:spTree>
+    <p:extLst>
+      <p:ext uri="{BB962C8B-B14F-4D97-AF65-F5344CB8AC3E}">
+        <p14:creationId xmlns:p14="http://schemas.microsoft.com/office/powerpoint/2010/main" val="95372301"/>
+      </p:ext>
+    </p:extLst>
+  </p:cSld>
+  <p:clrMapOvr>
+    <a:masterClrMapping/>
+  </p:clrMapOvr>
+</p:sld>
+</file>
+
 <file path=ppt/slides/slide9.xml><?xml version="1.0" encoding="utf-8"?>
 <p:sld xmlns:a="http://schemas.openxmlformats.org/drawingml/2006/main" xmlns:r="http://schemas.openxmlformats.org/officeDocument/2006/relationships" xmlns:p="http://schemas.openxmlformats.org/presentationml/2006/main">
   <p:cSld>
@@ -12721,7 +11883,7 @@
           <a:p>
             <a:r>
               <a:rPr lang="ru-RU" sz="4000" b="1" dirty="0"/>
-              <a:t>Метод оценки эффективности интерфейса GOMS</a:t>
+              <a:t>Классификация</a:t>
             </a:r>
           </a:p>
         </p:txBody>
@@ -12754,91 +11916,128 @@
           </a:bodyPr>
           <a:lstStyle/>
           <a:p>
-            <a:r>
-              <a:rPr lang="ru-RU" sz="2200" dirty="0">
-                <a:latin typeface="Times New Roman" panose="02020603050405020304" pitchFamily="18" charset="0"/>
-                <a:cs typeface="Times New Roman" panose="02020603050405020304" pitchFamily="18" charset="0"/>
-              </a:rPr>
-              <a:t>включает в себя модель </a:t>
-            </a:r>
-            <a:r>
-              <a:rPr lang="en-US" sz="2200" dirty="0">
-                <a:latin typeface="Times New Roman" panose="02020603050405020304" pitchFamily="18" charset="0"/>
-                <a:cs typeface="Times New Roman" panose="02020603050405020304" pitchFamily="18" charset="0"/>
-              </a:rPr>
-              <a:t>Keystroke-level Model (KLM)</a:t>
-            </a:r>
-            <a:endParaRPr lang="ru-RU" sz="2200" dirty="0">
-              <a:latin typeface="Times New Roman" panose="02020603050405020304" pitchFamily="18" charset="0"/>
-              <a:cs typeface="Times New Roman" panose="02020603050405020304" pitchFamily="18" charset="0"/>
-            </a:endParaRPr>
-          </a:p>
-          <a:p>
-            <a:r>
-              <a:rPr lang="en-US" sz="2200" dirty="0">
-                <a:latin typeface="Times New Roman" panose="02020603050405020304" pitchFamily="18" charset="0"/>
-                <a:cs typeface="Times New Roman" panose="02020603050405020304" pitchFamily="18" charset="0"/>
-              </a:rPr>
-              <a:t>KLM </a:t>
-            </a:r>
-            <a:r>
-              <a:rPr lang="ru-RU" sz="2200" dirty="0">
-                <a:latin typeface="Times New Roman" panose="02020603050405020304" pitchFamily="18" charset="0"/>
-                <a:cs typeface="Times New Roman" panose="02020603050405020304" pitchFamily="18" charset="0"/>
-              </a:rPr>
-              <a:t>выделяет элементарные задачи и длительность каждой из них (рассчитанные на основе усредненных данных лабораторных испытаний). Например</a:t>
-            </a:r>
-            <a:r>
-              <a:rPr lang="en-US" sz="2200" dirty="0">
-                <a:latin typeface="Times New Roman" panose="02020603050405020304" pitchFamily="18" charset="0"/>
-                <a:cs typeface="Times New Roman" panose="02020603050405020304" pitchFamily="18" charset="0"/>
-              </a:rPr>
-              <a:t>,</a:t>
-            </a:r>
-            <a:r>
-              <a:rPr lang="ru-RU" sz="2200" dirty="0">
-                <a:latin typeface="Times New Roman" panose="02020603050405020304" pitchFamily="18" charset="0"/>
-                <a:cs typeface="Times New Roman" panose="02020603050405020304" pitchFamily="18" charset="0"/>
-              </a:rPr>
-              <a:t> P – указание курсором мыши на объект</a:t>
-            </a:r>
-            <a:r>
-              <a:rPr lang="en-US" sz="2200" dirty="0">
-                <a:latin typeface="Times New Roman" panose="02020603050405020304" pitchFamily="18" charset="0"/>
-                <a:cs typeface="Times New Roman" panose="02020603050405020304" pitchFamily="18" charset="0"/>
-              </a:rPr>
-              <a:t> </a:t>
-            </a:r>
-            <a:r>
-              <a:rPr lang="ru-RU" sz="2200" dirty="0">
-                <a:latin typeface="Times New Roman" panose="02020603050405020304" pitchFamily="18" charset="0"/>
-                <a:cs typeface="Times New Roman" panose="02020603050405020304" pitchFamily="18" charset="0"/>
-              </a:rPr>
-              <a:t>–</a:t>
-            </a:r>
-            <a:r>
-              <a:rPr lang="en-US" sz="2200" dirty="0">
-                <a:latin typeface="Times New Roman" panose="02020603050405020304" pitchFamily="18" charset="0"/>
-                <a:cs typeface="Times New Roman" panose="02020603050405020304" pitchFamily="18" charset="0"/>
-              </a:rPr>
-              <a:t> </a:t>
-            </a:r>
-            <a:r>
-              <a:rPr lang="ru-RU" sz="2200" dirty="0">
-                <a:latin typeface="Times New Roman" panose="02020603050405020304" pitchFamily="18" charset="0"/>
-                <a:cs typeface="Times New Roman" panose="02020603050405020304" pitchFamily="18" charset="0"/>
-              </a:rPr>
-              <a:t>1.1 сек. и B – нажатие или отпускание мыши – 0.1 сек.</a:t>
-            </a:r>
-          </a:p>
-          <a:p>
-            <a:r>
-              <a:rPr lang="ru-RU" sz="2200" dirty="0">
+            <a:pPr marL="571500" indent="-342900">
+              <a:lnSpc>
+                <a:spcPct val="100000"/>
+              </a:lnSpc>
+            </a:pPr>
+            <a:r>
+              <a:rPr lang="ru-RU" sz="2600" dirty="0">
                 <a:latin typeface="Times New Roman" panose="02020603050405020304" pitchFamily="18" charset="0"/>
                 <a:ea typeface="Times New Roman" panose="02020603050405020304" pitchFamily="18" charset="0"/>
-                <a:cs typeface="Times New Roman" panose="02020603050405020304" pitchFamily="18" charset="0"/>
-              </a:rPr>
-              <a:t>оценка времени на решение задачи сводится к сложению продолжительностей каждой из простейших составляющих. Например, задача, состоящая из классов 〈P, P, B〉, потребует для завершения 2.3 сек. (1.1 сек. + 1.1 сек. + 0.1 сек.).</a:t>
+              </a:rPr>
+              <a:t>поиск ассоциативных правил</a:t>
+            </a:r>
+            <a:r>
+              <a:rPr lang="en-US" sz="2600" dirty="0">
+                <a:latin typeface="Times New Roman" panose="02020603050405020304" pitchFamily="18" charset="0"/>
+                <a:ea typeface="Times New Roman" panose="02020603050405020304" pitchFamily="18" charset="0"/>
+              </a:rPr>
+              <a:t> (</a:t>
+            </a:r>
+            <a:r>
+              <a:rPr lang="en-US" sz="2600" dirty="0" err="1">
+                <a:latin typeface="Times New Roman" panose="02020603050405020304" pitchFamily="18" charset="0"/>
+                <a:ea typeface="Times New Roman" panose="02020603050405020304" pitchFamily="18" charset="0"/>
+              </a:rPr>
+              <a:t>Apriori</a:t>
+            </a:r>
+            <a:r>
+              <a:rPr lang="en-US" sz="2600" dirty="0">
+                <a:latin typeface="Times New Roman" panose="02020603050405020304" pitchFamily="18" charset="0"/>
+                <a:ea typeface="Times New Roman" panose="02020603050405020304" pitchFamily="18" charset="0"/>
+              </a:rPr>
+              <a:t>)</a:t>
+            </a:r>
+            <a:r>
+              <a:rPr lang="ru-RU" sz="2600" dirty="0">
+                <a:latin typeface="Times New Roman" panose="02020603050405020304" pitchFamily="18" charset="0"/>
+                <a:ea typeface="Times New Roman" panose="02020603050405020304" pitchFamily="18" charset="0"/>
+              </a:rPr>
+              <a:t>;</a:t>
+            </a:r>
+          </a:p>
+          <a:p>
+            <a:pPr marL="571500" indent="-342900">
+              <a:lnSpc>
+                <a:spcPct val="100000"/>
+              </a:lnSpc>
+            </a:pPr>
+            <a:r>
+              <a:rPr lang="ru-RU" sz="2600" dirty="0">
+                <a:latin typeface="Times New Roman" panose="02020603050405020304" pitchFamily="18" charset="0"/>
+                <a:ea typeface="Times New Roman" panose="02020603050405020304" pitchFamily="18" charset="0"/>
+              </a:rPr>
+              <a:t>поиск последовательных шаблонов</a:t>
+            </a:r>
+            <a:r>
+              <a:rPr lang="en-US" sz="2600" dirty="0">
+                <a:latin typeface="Times New Roman" panose="02020603050405020304" pitchFamily="18" charset="0"/>
+                <a:ea typeface="Times New Roman" panose="02020603050405020304" pitchFamily="18" charset="0"/>
+              </a:rPr>
+              <a:t> (GSP)</a:t>
+            </a:r>
+            <a:r>
+              <a:rPr lang="ru-RU" sz="2600" dirty="0">
+                <a:latin typeface="Times New Roman" panose="02020603050405020304" pitchFamily="18" charset="0"/>
+                <a:ea typeface="Times New Roman" panose="02020603050405020304" pitchFamily="18" charset="0"/>
+              </a:rPr>
+              <a:t>;</a:t>
+            </a:r>
+          </a:p>
+          <a:p>
+            <a:pPr marL="571500" indent="-342900">
+              <a:lnSpc>
+                <a:spcPct val="100000"/>
+              </a:lnSpc>
+            </a:pPr>
+            <a:r>
+              <a:rPr lang="ru-RU" sz="2600" dirty="0">
+                <a:latin typeface="Times New Roman" panose="02020603050405020304" pitchFamily="18" charset="0"/>
+                <a:ea typeface="Times New Roman" panose="02020603050405020304" pitchFamily="18" charset="0"/>
+              </a:rPr>
+              <a:t>сбор и анализ временных характеристик выполнения пользователем действий и промежутков между ними</a:t>
+            </a:r>
+            <a:r>
+              <a:rPr lang="en-US" sz="2600" dirty="0">
+                <a:latin typeface="Times New Roman" panose="02020603050405020304" pitchFamily="18" charset="0"/>
+                <a:ea typeface="Times New Roman" panose="02020603050405020304" pitchFamily="18" charset="0"/>
+              </a:rPr>
+              <a:t> (GOMS)</a:t>
+            </a:r>
+            <a:r>
+              <a:rPr lang="ru-RU" sz="2600" dirty="0">
+                <a:latin typeface="Times New Roman" panose="02020603050405020304" pitchFamily="18" charset="0"/>
+                <a:ea typeface="Times New Roman" panose="02020603050405020304" pitchFamily="18" charset="0"/>
+              </a:rPr>
+              <a:t>;</a:t>
+            </a:r>
+          </a:p>
+          <a:p>
+            <a:pPr marL="571500" indent="-342900">
+              <a:lnSpc>
+                <a:spcPct val="100000"/>
+              </a:lnSpc>
+            </a:pPr>
+            <a:r>
+              <a:rPr lang="ru-RU" sz="2600" dirty="0">
+                <a:latin typeface="Times New Roman" panose="02020603050405020304" pitchFamily="18" charset="0"/>
+                <a:ea typeface="Times New Roman" panose="02020603050405020304" pitchFamily="18" charset="0"/>
+              </a:rPr>
+              <a:t>вычисление уровней поддержки шаблонов поведения пользователя</a:t>
+            </a:r>
+            <a:br>
+              <a:rPr lang="ru-RU" sz="2600" dirty="0">
+                <a:latin typeface="Times New Roman" panose="02020603050405020304" pitchFamily="18" charset="0"/>
+                <a:ea typeface="Times New Roman" panose="02020603050405020304" pitchFamily="18" charset="0"/>
+              </a:rPr>
+            </a:br>
+            <a:r>
+              <a:rPr lang="ru-RU" sz="2600" dirty="0">
+                <a:latin typeface="Times New Roman" panose="02020603050405020304" pitchFamily="18" charset="0"/>
+                <a:ea typeface="Times New Roman" panose="02020603050405020304" pitchFamily="18" charset="0"/>
+              </a:rPr>
+              <a:t>(Математическая модель пользовательской активности ПО).</a:t>
             </a:r>
           </a:p>
         </p:txBody>
@@ -12875,7 +12074,7 @@
     </p:spTree>
     <p:extLst>
       <p:ext uri="{BB962C8B-B14F-4D97-AF65-F5344CB8AC3E}">
-        <p14:creationId xmlns:p14="http://schemas.microsoft.com/office/powerpoint/2010/main" val="95372301"/>
+        <p14:creationId xmlns:p14="http://schemas.microsoft.com/office/powerpoint/2010/main" val="2176375297"/>
       </p:ext>
     </p:extLst>
   </p:cSld>

</xml_diff>